<commit_message>
stub for lecture 25...
</commit_message>
<xml_diff>
--- a/classes/prog2017/Prog3-Lecture25.pptx
+++ b/classes/prog2017/Prog3-Lecture25.pptx
@@ -4,6 +4,9 @@
   <p:sldMasterIdLst>
     <p:sldMasterId id="2147483648" r:id="rId1"/>
   </p:sldMasterIdLst>
+  <p:notesMasterIdLst>
+    <p:notesMasterId r:id="rId18"/>
+  </p:notesMasterIdLst>
   <p:sldIdLst>
     <p:sldId id="256" r:id="rId2"/>
     <p:sldId id="257" r:id="rId3"/>
@@ -14,6 +17,13 @@
     <p:sldId id="263" r:id="rId8"/>
     <p:sldId id="262" r:id="rId9"/>
     <p:sldId id="264" r:id="rId10"/>
+    <p:sldId id="265" r:id="rId11"/>
+    <p:sldId id="266" r:id="rId12"/>
+    <p:sldId id="267" r:id="rId13"/>
+    <p:sldId id="268" r:id="rId14"/>
+    <p:sldId id="271" r:id="rId15"/>
+    <p:sldId id="269" r:id="rId16"/>
+    <p:sldId id="270" r:id="rId17"/>
   </p:sldIdLst>
   <p:sldSz cx="12192000" cy="6858000"/>
   <p:notesSz cx="6858000" cy="9144000"/>
@@ -124,6 +134,439 @@
 <p1510:revInfo xmlns:a="http://schemas.openxmlformats.org/drawingml/2006/main" xmlns:r="http://schemas.openxmlformats.org/officeDocument/2006/relationships" xmlns:p1510="http://schemas.microsoft.com/office/powerpoint/2015/10/main"/>
 </file>
 
+<file path=ppt/notesMasters/notesMaster1.xml><?xml version="1.0" encoding="utf-8"?>
+<p:notesMaster xmlns:a="http://schemas.openxmlformats.org/drawingml/2006/main" xmlns:r="http://schemas.openxmlformats.org/officeDocument/2006/relationships" xmlns:p="http://schemas.openxmlformats.org/presentationml/2006/main">
+  <p:cSld>
+    <p:bg>
+      <p:bgRef idx="1001">
+        <a:schemeClr val="bg1"/>
+      </p:bgRef>
+    </p:bg>
+    <p:spTree>
+      <p:nvGrpSpPr>
+        <p:cNvPr id="1" name=""/>
+        <p:cNvGrpSpPr/>
+        <p:nvPr/>
+      </p:nvGrpSpPr>
+      <p:grpSpPr>
+        <a:xfrm>
+          <a:off x="0" y="0"/>
+          <a:ext cx="0" cy="0"/>
+          <a:chOff x="0" y="0"/>
+          <a:chExt cx="0" cy="0"/>
+        </a:xfrm>
+      </p:grpSpPr>
+      <p:sp>
+        <p:nvSpPr>
+          <p:cNvPr id="2" name="Header Placeholder 1"/>
+          <p:cNvSpPr>
+            <a:spLocks noGrp="1"/>
+          </p:cNvSpPr>
+          <p:nvPr>
+            <p:ph type="hdr" sz="quarter"/>
+          </p:nvPr>
+        </p:nvSpPr>
+        <p:spPr>
+          <a:xfrm>
+            <a:off x="0" y="0"/>
+            <a:ext cx="2971800" cy="458788"/>
+          </a:xfrm>
+          <a:prstGeom prst="rect">
+            <a:avLst/>
+          </a:prstGeom>
+        </p:spPr>
+        <p:txBody>
+          <a:bodyPr vert="horz" lIns="91440" tIns="45720" rIns="91440" bIns="45720" rtlCol="0"/>
+          <a:lstStyle>
+            <a:lvl1pPr algn="l">
+              <a:defRPr sz="1200"/>
+            </a:lvl1pPr>
+          </a:lstStyle>
+          <a:p>
+            <a:endParaRPr lang="en-US"/>
+          </a:p>
+        </p:txBody>
+      </p:sp>
+      <p:sp>
+        <p:nvSpPr>
+          <p:cNvPr id="3" name="Date Placeholder 2"/>
+          <p:cNvSpPr>
+            <a:spLocks noGrp="1"/>
+          </p:cNvSpPr>
+          <p:nvPr>
+            <p:ph type="dt" idx="1"/>
+          </p:nvPr>
+        </p:nvSpPr>
+        <p:spPr>
+          <a:xfrm>
+            <a:off x="3884613" y="0"/>
+            <a:ext cx="2971800" cy="458788"/>
+          </a:xfrm>
+          <a:prstGeom prst="rect">
+            <a:avLst/>
+          </a:prstGeom>
+        </p:spPr>
+        <p:txBody>
+          <a:bodyPr vert="horz" lIns="91440" tIns="45720" rIns="91440" bIns="45720" rtlCol="0"/>
+          <a:lstStyle>
+            <a:lvl1pPr algn="r">
+              <a:defRPr sz="1200"/>
+            </a:lvl1pPr>
+          </a:lstStyle>
+          <a:p>
+            <a:fld id="{3BABB8C3-AB64-4198-A259-5325705B1586}" type="datetimeFigureOut">
+              <a:rPr lang="en-US" smtClean="0"/>
+              <a:t>11/22/2017</a:t>
+            </a:fld>
+            <a:endParaRPr lang="en-US"/>
+          </a:p>
+        </p:txBody>
+      </p:sp>
+      <p:sp>
+        <p:nvSpPr>
+          <p:cNvPr id="4" name="Slide Image Placeholder 3"/>
+          <p:cNvSpPr>
+            <a:spLocks noGrp="1" noRot="1" noChangeAspect="1"/>
+          </p:cNvSpPr>
+          <p:nvPr>
+            <p:ph type="sldImg" idx="2"/>
+          </p:nvPr>
+        </p:nvSpPr>
+        <p:spPr>
+          <a:xfrm>
+            <a:off x="685800" y="1143000"/>
+            <a:ext cx="5486400" cy="3086100"/>
+          </a:xfrm>
+          <a:prstGeom prst="rect">
+            <a:avLst/>
+          </a:prstGeom>
+          <a:noFill/>
+          <a:ln w="12700">
+            <a:solidFill>
+              <a:prstClr val="black"/>
+            </a:solidFill>
+          </a:ln>
+        </p:spPr>
+        <p:txBody>
+          <a:bodyPr vert="horz" lIns="91440" tIns="45720" rIns="91440" bIns="45720" rtlCol="0" anchor="ctr"/>
+          <a:lstStyle/>
+          <a:p>
+            <a:endParaRPr lang="en-US"/>
+          </a:p>
+        </p:txBody>
+      </p:sp>
+      <p:sp>
+        <p:nvSpPr>
+          <p:cNvPr id="5" name="Notes Placeholder 4"/>
+          <p:cNvSpPr>
+            <a:spLocks noGrp="1"/>
+          </p:cNvSpPr>
+          <p:nvPr>
+            <p:ph type="body" sz="quarter" idx="3"/>
+          </p:nvPr>
+        </p:nvSpPr>
+        <p:spPr>
+          <a:xfrm>
+            <a:off x="685800" y="4400550"/>
+            <a:ext cx="5486400" cy="3600450"/>
+          </a:xfrm>
+          <a:prstGeom prst="rect">
+            <a:avLst/>
+          </a:prstGeom>
+        </p:spPr>
+        <p:txBody>
+          <a:bodyPr vert="horz" lIns="91440" tIns="45720" rIns="91440" bIns="45720" rtlCol="0"/>
+          <a:lstStyle/>
+          <a:p>
+            <a:pPr lvl="0"/>
+            <a:r>
+              <a:rPr lang="en-US"/>
+              <a:t>Edit Master text styles</a:t>
+            </a:r>
+          </a:p>
+          <a:p>
+            <a:pPr lvl="1"/>
+            <a:r>
+              <a:rPr lang="en-US"/>
+              <a:t>Second level</a:t>
+            </a:r>
+          </a:p>
+          <a:p>
+            <a:pPr lvl="2"/>
+            <a:r>
+              <a:rPr lang="en-US"/>
+              <a:t>Third level</a:t>
+            </a:r>
+          </a:p>
+          <a:p>
+            <a:pPr lvl="3"/>
+            <a:r>
+              <a:rPr lang="en-US"/>
+              <a:t>Fourth level</a:t>
+            </a:r>
+          </a:p>
+          <a:p>
+            <a:pPr lvl="4"/>
+            <a:r>
+              <a:rPr lang="en-US"/>
+              <a:t>Fifth level</a:t>
+            </a:r>
+          </a:p>
+        </p:txBody>
+      </p:sp>
+      <p:sp>
+        <p:nvSpPr>
+          <p:cNvPr id="6" name="Footer Placeholder 5"/>
+          <p:cNvSpPr>
+            <a:spLocks noGrp="1"/>
+          </p:cNvSpPr>
+          <p:nvPr>
+            <p:ph type="ftr" sz="quarter" idx="4"/>
+          </p:nvPr>
+        </p:nvSpPr>
+        <p:spPr>
+          <a:xfrm>
+            <a:off x="0" y="8685213"/>
+            <a:ext cx="2971800" cy="458787"/>
+          </a:xfrm>
+          <a:prstGeom prst="rect">
+            <a:avLst/>
+          </a:prstGeom>
+        </p:spPr>
+        <p:txBody>
+          <a:bodyPr vert="horz" lIns="91440" tIns="45720" rIns="91440" bIns="45720" rtlCol="0" anchor="b"/>
+          <a:lstStyle>
+            <a:lvl1pPr algn="l">
+              <a:defRPr sz="1200"/>
+            </a:lvl1pPr>
+          </a:lstStyle>
+          <a:p>
+            <a:endParaRPr lang="en-US"/>
+          </a:p>
+        </p:txBody>
+      </p:sp>
+      <p:sp>
+        <p:nvSpPr>
+          <p:cNvPr id="7" name="Slide Number Placeholder 6"/>
+          <p:cNvSpPr>
+            <a:spLocks noGrp="1"/>
+          </p:cNvSpPr>
+          <p:nvPr>
+            <p:ph type="sldNum" sz="quarter" idx="5"/>
+          </p:nvPr>
+        </p:nvSpPr>
+        <p:spPr>
+          <a:xfrm>
+            <a:off x="3884613" y="8685213"/>
+            <a:ext cx="2971800" cy="458787"/>
+          </a:xfrm>
+          <a:prstGeom prst="rect">
+            <a:avLst/>
+          </a:prstGeom>
+        </p:spPr>
+        <p:txBody>
+          <a:bodyPr vert="horz" lIns="91440" tIns="45720" rIns="91440" bIns="45720" rtlCol="0" anchor="b"/>
+          <a:lstStyle>
+            <a:lvl1pPr algn="r">
+              <a:defRPr sz="1200"/>
+            </a:lvl1pPr>
+          </a:lstStyle>
+          <a:p>
+            <a:fld id="{425BF44C-66DE-47A0-9AA7-EFF3B79B935C}" type="slidenum">
+              <a:rPr lang="en-US" smtClean="0"/>
+              <a:t>‹#›</a:t>
+            </a:fld>
+            <a:endParaRPr lang="en-US"/>
+          </a:p>
+        </p:txBody>
+      </p:sp>
+    </p:spTree>
+    <p:extLst>
+      <p:ext uri="{BB962C8B-B14F-4D97-AF65-F5344CB8AC3E}">
+        <p14:creationId xmlns:p14="http://schemas.microsoft.com/office/powerpoint/2010/main" val="2036820313"/>
+      </p:ext>
+    </p:extLst>
+  </p:cSld>
+  <p:clrMap bg1="lt1" tx1="dk1" bg2="lt2" tx2="dk2" accent1="accent1" accent2="accent2" accent3="accent3" accent4="accent4" accent5="accent5" accent6="accent6" hlink="hlink" folHlink="folHlink"/>
+  <p:notesStyle>
+    <a:lvl1pPr marL="0" algn="l" defTabSz="914400" rtl="0" eaLnBrk="1" latinLnBrk="0" hangingPunct="1">
+      <a:defRPr sz="1200" kern="1200">
+        <a:solidFill>
+          <a:schemeClr val="tx1"/>
+        </a:solidFill>
+        <a:latin typeface="+mn-lt"/>
+        <a:ea typeface="+mn-ea"/>
+        <a:cs typeface="+mn-cs"/>
+      </a:defRPr>
+    </a:lvl1pPr>
+    <a:lvl2pPr marL="457200" algn="l" defTabSz="914400" rtl="0" eaLnBrk="1" latinLnBrk="0" hangingPunct="1">
+      <a:defRPr sz="1200" kern="1200">
+        <a:solidFill>
+          <a:schemeClr val="tx1"/>
+        </a:solidFill>
+        <a:latin typeface="+mn-lt"/>
+        <a:ea typeface="+mn-ea"/>
+        <a:cs typeface="+mn-cs"/>
+      </a:defRPr>
+    </a:lvl2pPr>
+    <a:lvl3pPr marL="914400" algn="l" defTabSz="914400" rtl="0" eaLnBrk="1" latinLnBrk="0" hangingPunct="1">
+      <a:defRPr sz="1200" kern="1200">
+        <a:solidFill>
+          <a:schemeClr val="tx1"/>
+        </a:solidFill>
+        <a:latin typeface="+mn-lt"/>
+        <a:ea typeface="+mn-ea"/>
+        <a:cs typeface="+mn-cs"/>
+      </a:defRPr>
+    </a:lvl3pPr>
+    <a:lvl4pPr marL="1371600" algn="l" defTabSz="914400" rtl="0" eaLnBrk="1" latinLnBrk="0" hangingPunct="1">
+      <a:defRPr sz="1200" kern="1200">
+        <a:solidFill>
+          <a:schemeClr val="tx1"/>
+        </a:solidFill>
+        <a:latin typeface="+mn-lt"/>
+        <a:ea typeface="+mn-ea"/>
+        <a:cs typeface="+mn-cs"/>
+      </a:defRPr>
+    </a:lvl4pPr>
+    <a:lvl5pPr marL="1828800" algn="l" defTabSz="914400" rtl="0" eaLnBrk="1" latinLnBrk="0" hangingPunct="1">
+      <a:defRPr sz="1200" kern="1200">
+        <a:solidFill>
+          <a:schemeClr val="tx1"/>
+        </a:solidFill>
+        <a:latin typeface="+mn-lt"/>
+        <a:ea typeface="+mn-ea"/>
+        <a:cs typeface="+mn-cs"/>
+      </a:defRPr>
+    </a:lvl5pPr>
+    <a:lvl6pPr marL="2286000" algn="l" defTabSz="914400" rtl="0" eaLnBrk="1" latinLnBrk="0" hangingPunct="1">
+      <a:defRPr sz="1200" kern="1200">
+        <a:solidFill>
+          <a:schemeClr val="tx1"/>
+        </a:solidFill>
+        <a:latin typeface="+mn-lt"/>
+        <a:ea typeface="+mn-ea"/>
+        <a:cs typeface="+mn-cs"/>
+      </a:defRPr>
+    </a:lvl6pPr>
+    <a:lvl7pPr marL="2743200" algn="l" defTabSz="914400" rtl="0" eaLnBrk="1" latinLnBrk="0" hangingPunct="1">
+      <a:defRPr sz="1200" kern="1200">
+        <a:solidFill>
+          <a:schemeClr val="tx1"/>
+        </a:solidFill>
+        <a:latin typeface="+mn-lt"/>
+        <a:ea typeface="+mn-ea"/>
+        <a:cs typeface="+mn-cs"/>
+      </a:defRPr>
+    </a:lvl7pPr>
+    <a:lvl8pPr marL="3200400" algn="l" defTabSz="914400" rtl="0" eaLnBrk="1" latinLnBrk="0" hangingPunct="1">
+      <a:defRPr sz="1200" kern="1200">
+        <a:solidFill>
+          <a:schemeClr val="tx1"/>
+        </a:solidFill>
+        <a:latin typeface="+mn-lt"/>
+        <a:ea typeface="+mn-ea"/>
+        <a:cs typeface="+mn-cs"/>
+      </a:defRPr>
+    </a:lvl8pPr>
+    <a:lvl9pPr marL="3657600" algn="l" defTabSz="914400" rtl="0" eaLnBrk="1" latinLnBrk="0" hangingPunct="1">
+      <a:defRPr sz="1200" kern="1200">
+        <a:solidFill>
+          <a:schemeClr val="tx1"/>
+        </a:solidFill>
+        <a:latin typeface="+mn-lt"/>
+        <a:ea typeface="+mn-ea"/>
+        <a:cs typeface="+mn-cs"/>
+      </a:defRPr>
+    </a:lvl9pPr>
+  </p:notesStyle>
+</p:notesMaster>
+</file>
+
+<file path=ppt/notesSlides/notesSlide1.xml><?xml version="1.0" encoding="utf-8"?>
+<p:notes xmlns:a="http://schemas.openxmlformats.org/drawingml/2006/main" xmlns:r="http://schemas.openxmlformats.org/officeDocument/2006/relationships" xmlns:p="http://schemas.openxmlformats.org/presentationml/2006/main">
+  <p:cSld>
+    <p:spTree>
+      <p:nvGrpSpPr>
+        <p:cNvPr id="1" name=""/>
+        <p:cNvGrpSpPr/>
+        <p:nvPr/>
+      </p:nvGrpSpPr>
+      <p:grpSpPr>
+        <a:xfrm>
+          <a:off x="0" y="0"/>
+          <a:ext cx="0" cy="0"/>
+          <a:chOff x="0" y="0"/>
+          <a:chExt cx="0" cy="0"/>
+        </a:xfrm>
+      </p:grpSpPr>
+      <p:sp>
+        <p:nvSpPr>
+          <p:cNvPr id="2" name="Slide Image Placeholder 1"/>
+          <p:cNvSpPr>
+            <a:spLocks noGrp="1" noRot="1" noChangeAspect="1"/>
+          </p:cNvSpPr>
+          <p:nvPr>
+            <p:ph type="sldImg"/>
+          </p:nvPr>
+        </p:nvSpPr>
+        <p:spPr/>
+      </p:sp>
+      <p:sp>
+        <p:nvSpPr>
+          <p:cNvPr id="3" name="Notes Placeholder 2"/>
+          <p:cNvSpPr>
+            <a:spLocks noGrp="1"/>
+          </p:cNvSpPr>
+          <p:nvPr>
+            <p:ph type="body" idx="1"/>
+          </p:nvPr>
+        </p:nvSpPr>
+        <p:spPr/>
+        <p:txBody>
+          <a:bodyPr/>
+          <a:lstStyle/>
+          <a:p>
+            <a:endParaRPr lang="en-US" dirty="0"/>
+          </a:p>
+        </p:txBody>
+      </p:sp>
+      <p:sp>
+        <p:nvSpPr>
+          <p:cNvPr id="4" name="Slide Number Placeholder 3"/>
+          <p:cNvSpPr>
+            <a:spLocks noGrp="1"/>
+          </p:cNvSpPr>
+          <p:nvPr>
+            <p:ph type="sldNum" sz="quarter" idx="10"/>
+          </p:nvPr>
+        </p:nvSpPr>
+        <p:spPr/>
+        <p:txBody>
+          <a:bodyPr/>
+          <a:lstStyle/>
+          <a:p>
+            <a:fld id="{425BF44C-66DE-47A0-9AA7-EFF3B79B935C}" type="slidenum">
+              <a:rPr lang="en-US" smtClean="0"/>
+              <a:t>11</a:t>
+            </a:fld>
+            <a:endParaRPr lang="en-US"/>
+          </a:p>
+        </p:txBody>
+      </p:sp>
+    </p:spTree>
+    <p:extLst>
+      <p:ext uri="{BB962C8B-B14F-4D97-AF65-F5344CB8AC3E}">
+        <p14:creationId xmlns:p14="http://schemas.microsoft.com/office/powerpoint/2010/main" val="74796127"/>
+      </p:ext>
+    </p:extLst>
+  </p:cSld>
+  <p:clrMapOvr>
+    <a:masterClrMapping/>
+  </p:clrMapOvr>
+</p:notes>
+</file>
+
 <file path=ppt/slideLayouts/slideLayout1.xml><?xml version="1.0" encoding="utf-8"?>
 <p:sldLayout xmlns:a="http://schemas.openxmlformats.org/drawingml/2006/main" xmlns:r="http://schemas.openxmlformats.org/officeDocument/2006/relationships" xmlns:p="http://schemas.openxmlformats.org/presentationml/2006/main" type="title" preserve="1">
   <p:cSld name="Title Slide">
@@ -271,7 +714,7 @@
           <a:p>
             <a:fld id="{32FFEE7D-2242-46A4-9E7F-1E413A012AD3}" type="datetimeFigureOut">
               <a:rPr lang="en-US" smtClean="0"/>
-              <a:t>11/21/2017</a:t>
+              <a:t>11/22/2017</a:t>
             </a:fld>
             <a:endParaRPr lang="en-US"/>
           </a:p>
@@ -469,7 +912,7 @@
           <a:p>
             <a:fld id="{32FFEE7D-2242-46A4-9E7F-1E413A012AD3}" type="datetimeFigureOut">
               <a:rPr lang="en-US" smtClean="0"/>
-              <a:t>11/21/2017</a:t>
+              <a:t>11/22/2017</a:t>
             </a:fld>
             <a:endParaRPr lang="en-US"/>
           </a:p>
@@ -677,7 +1120,7 @@
           <a:p>
             <a:fld id="{32FFEE7D-2242-46A4-9E7F-1E413A012AD3}" type="datetimeFigureOut">
               <a:rPr lang="en-US" smtClean="0"/>
-              <a:t>11/21/2017</a:t>
+              <a:t>11/22/2017</a:t>
             </a:fld>
             <a:endParaRPr lang="en-US"/>
           </a:p>
@@ -875,7 +1318,7 @@
           <a:p>
             <a:fld id="{32FFEE7D-2242-46A4-9E7F-1E413A012AD3}" type="datetimeFigureOut">
               <a:rPr lang="en-US" smtClean="0"/>
-              <a:t>11/21/2017</a:t>
+              <a:t>11/22/2017</a:t>
             </a:fld>
             <a:endParaRPr lang="en-US"/>
           </a:p>
@@ -1150,7 +1593,7 @@
           <a:p>
             <a:fld id="{32FFEE7D-2242-46A4-9E7F-1E413A012AD3}" type="datetimeFigureOut">
               <a:rPr lang="en-US" smtClean="0"/>
-              <a:t>11/21/2017</a:t>
+              <a:t>11/22/2017</a:t>
             </a:fld>
             <a:endParaRPr lang="en-US"/>
           </a:p>
@@ -1415,7 +1858,7 @@
           <a:p>
             <a:fld id="{32FFEE7D-2242-46A4-9E7F-1E413A012AD3}" type="datetimeFigureOut">
               <a:rPr lang="en-US" smtClean="0"/>
-              <a:t>11/21/2017</a:t>
+              <a:t>11/22/2017</a:t>
             </a:fld>
             <a:endParaRPr lang="en-US"/>
           </a:p>
@@ -1827,7 +2270,7 @@
           <a:p>
             <a:fld id="{32FFEE7D-2242-46A4-9E7F-1E413A012AD3}" type="datetimeFigureOut">
               <a:rPr lang="en-US" smtClean="0"/>
-              <a:t>11/21/2017</a:t>
+              <a:t>11/22/2017</a:t>
             </a:fld>
             <a:endParaRPr lang="en-US"/>
           </a:p>
@@ -1968,7 +2411,7 @@
           <a:p>
             <a:fld id="{32FFEE7D-2242-46A4-9E7F-1E413A012AD3}" type="datetimeFigureOut">
               <a:rPr lang="en-US" smtClean="0"/>
-              <a:t>11/21/2017</a:t>
+              <a:t>11/22/2017</a:t>
             </a:fld>
             <a:endParaRPr lang="en-US"/>
           </a:p>
@@ -2081,7 +2524,7 @@
           <a:p>
             <a:fld id="{32FFEE7D-2242-46A4-9E7F-1E413A012AD3}" type="datetimeFigureOut">
               <a:rPr lang="en-US" smtClean="0"/>
-              <a:t>11/21/2017</a:t>
+              <a:t>11/22/2017</a:t>
             </a:fld>
             <a:endParaRPr lang="en-US"/>
           </a:p>
@@ -2392,7 +2835,7 @@
           <a:p>
             <a:fld id="{32FFEE7D-2242-46A4-9E7F-1E413A012AD3}" type="datetimeFigureOut">
               <a:rPr lang="en-US" smtClean="0"/>
-              <a:t>11/21/2017</a:t>
+              <a:t>11/22/2017</a:t>
             </a:fld>
             <a:endParaRPr lang="en-US"/>
           </a:p>
@@ -2680,7 +3123,7 @@
           <a:p>
             <a:fld id="{32FFEE7D-2242-46A4-9E7F-1E413A012AD3}" type="datetimeFigureOut">
               <a:rPr lang="en-US" smtClean="0"/>
-              <a:t>11/21/2017</a:t>
+              <a:t>11/22/2017</a:t>
             </a:fld>
             <a:endParaRPr lang="en-US"/>
           </a:p>
@@ -2921,7 +3364,7 @@
           <a:p>
             <a:fld id="{32FFEE7D-2242-46A4-9E7F-1E413A012AD3}" type="datetimeFigureOut">
               <a:rPr lang="en-US" smtClean="0"/>
-              <a:t>11/21/2017</a:t>
+              <a:t>11/22/2017</a:t>
             </a:fld>
             <a:endParaRPr lang="en-US"/>
           </a:p>
@@ -3352,7 +3795,7 @@
         </p:nvSpPr>
         <p:spPr>
           <a:xfrm>
-            <a:off x="822960" y="340360"/>
+            <a:off x="822960" y="345440"/>
             <a:ext cx="5863400" cy="923330"/>
           </a:xfrm>
           <a:prstGeom prst="rect">
@@ -3416,7 +3859,7 @@
         </p:nvCxnSpPr>
         <p:spPr>
           <a:xfrm flipH="1">
-            <a:off x="2915920" y="533400"/>
+            <a:off x="2915920" y="538480"/>
             <a:ext cx="1112520" cy="0"/>
           </a:xfrm>
           <a:prstGeom prst="straightConnector1">
@@ -3445,6 +3888,915 @@
     <p:extLst>
       <p:ext uri="{BB962C8B-B14F-4D97-AF65-F5344CB8AC3E}">
         <p14:creationId xmlns:p14="http://schemas.microsoft.com/office/powerpoint/2010/main" val="1065901417"/>
+      </p:ext>
+    </p:extLst>
+  </p:cSld>
+  <p:clrMapOvr>
+    <a:masterClrMapping/>
+  </p:clrMapOvr>
+</p:sld>
+</file>
+
+<file path=ppt/slides/slide10.xml><?xml version="1.0" encoding="utf-8"?>
+<p:sld xmlns:a="http://schemas.openxmlformats.org/drawingml/2006/main" xmlns:r="http://schemas.openxmlformats.org/officeDocument/2006/relationships" xmlns:p="http://schemas.openxmlformats.org/presentationml/2006/main">
+  <p:cSld>
+    <p:spTree>
+      <p:nvGrpSpPr>
+        <p:cNvPr id="1" name=""/>
+        <p:cNvGrpSpPr/>
+        <p:nvPr/>
+      </p:nvGrpSpPr>
+      <p:grpSpPr>
+        <a:xfrm>
+          <a:off x="0" y="0"/>
+          <a:ext cx="0" cy="0"/>
+          <a:chOff x="0" y="0"/>
+          <a:chExt cx="0" cy="0"/>
+        </a:xfrm>
+      </p:grpSpPr>
+      <p:pic>
+        <p:nvPicPr>
+          <p:cNvPr id="4" name="Picture 3">
+            <a:extLst>
+              <a:ext uri="{FF2B5EF4-FFF2-40B4-BE49-F238E27FC236}">
+                <a16:creationId xmlns:a16="http://schemas.microsoft.com/office/drawing/2014/main" id="{4CD7F0F3-1A64-4DE0-A91A-F5C93B17E013}"/>
+              </a:ext>
+            </a:extLst>
+          </p:cNvPr>
+          <p:cNvPicPr>
+            <a:picLocks noChangeAspect="1"/>
+          </p:cNvPicPr>
+          <p:nvPr/>
+        </p:nvPicPr>
+        <p:blipFill>
+          <a:blip r:embed="rId2"/>
+          <a:stretch>
+            <a:fillRect/>
+          </a:stretch>
+        </p:blipFill>
+        <p:spPr>
+          <a:xfrm>
+            <a:off x="421640" y="635149"/>
+            <a:ext cx="10586720" cy="5381324"/>
+          </a:xfrm>
+          <a:prstGeom prst="rect">
+            <a:avLst/>
+          </a:prstGeom>
+        </p:spPr>
+      </p:pic>
+      <p:sp>
+        <p:nvSpPr>
+          <p:cNvPr id="5" name="TextBox 4">
+            <a:extLst>
+              <a:ext uri="{FF2B5EF4-FFF2-40B4-BE49-F238E27FC236}">
+                <a16:creationId xmlns:a16="http://schemas.microsoft.com/office/drawing/2014/main" id="{40F72980-1A64-412C-8819-DF0AE8D685D2}"/>
+              </a:ext>
+            </a:extLst>
+          </p:cNvPr>
+          <p:cNvSpPr txBox="1"/>
+          <p:nvPr/>
+        </p:nvSpPr>
+        <p:spPr>
+          <a:xfrm>
+            <a:off x="1219200" y="172720"/>
+            <a:ext cx="9959586" cy="369332"/>
+          </a:xfrm>
+          <a:prstGeom prst="rect">
+            <a:avLst/>
+          </a:prstGeom>
+          <a:noFill/>
+        </p:spPr>
+        <p:txBody>
+          <a:bodyPr wrap="none" rtlCol="0">
+            <a:spAutoFit/>
+          </a:bodyPr>
+          <a:lstStyle/>
+          <a:p>
+            <a:r>
+              <a:rPr lang="en-US" dirty="0"/>
+              <a:t>Closures allow for an inner function to see an outer function’s scope after the outer function </a:t>
+            </a:r>
+            <a:r>
+              <a:rPr lang="en-US"/>
+              <a:t>has exited…</a:t>
+            </a:r>
+          </a:p>
+        </p:txBody>
+      </p:sp>
+      <p:sp>
+        <p:nvSpPr>
+          <p:cNvPr id="6" name="TextBox 5">
+            <a:extLst>
+              <a:ext uri="{FF2B5EF4-FFF2-40B4-BE49-F238E27FC236}">
+                <a16:creationId xmlns:a16="http://schemas.microsoft.com/office/drawing/2014/main" id="{0643AECF-7670-4DD8-8202-0A959AE2D705}"/>
+              </a:ext>
+            </a:extLst>
+          </p:cNvPr>
+          <p:cNvSpPr txBox="1"/>
+          <p:nvPr/>
+        </p:nvSpPr>
+        <p:spPr>
+          <a:xfrm>
+            <a:off x="655320" y="6217920"/>
+            <a:ext cx="3285515" cy="369332"/>
+          </a:xfrm>
+          <a:prstGeom prst="rect">
+            <a:avLst/>
+          </a:prstGeom>
+          <a:noFill/>
+        </p:spPr>
+        <p:txBody>
+          <a:bodyPr wrap="none" rtlCol="0">
+            <a:spAutoFit/>
+          </a:bodyPr>
+          <a:lstStyle/>
+          <a:p>
+            <a:r>
+              <a:rPr lang="en-US" dirty="0"/>
+              <a:t>Secrets of the </a:t>
+            </a:r>
+            <a:r>
+              <a:rPr lang="en-US" dirty="0" err="1"/>
+              <a:t>Javascript</a:t>
+            </a:r>
+            <a:r>
+              <a:rPr lang="en-US" dirty="0"/>
+              <a:t> Ninja’s…</a:t>
+            </a:r>
+          </a:p>
+        </p:txBody>
+      </p:sp>
+    </p:spTree>
+    <p:extLst>
+      <p:ext uri="{BB962C8B-B14F-4D97-AF65-F5344CB8AC3E}">
+        <p14:creationId xmlns:p14="http://schemas.microsoft.com/office/powerpoint/2010/main" val="181423494"/>
+      </p:ext>
+    </p:extLst>
+  </p:cSld>
+  <p:clrMapOvr>
+    <a:masterClrMapping/>
+  </p:clrMapOvr>
+</p:sld>
+</file>
+
+<file path=ppt/slides/slide11.xml><?xml version="1.0" encoding="utf-8"?>
+<p:sld xmlns:a="http://schemas.openxmlformats.org/drawingml/2006/main" xmlns:r="http://schemas.openxmlformats.org/officeDocument/2006/relationships" xmlns:p="http://schemas.openxmlformats.org/presentationml/2006/main">
+  <p:cSld>
+    <p:spTree>
+      <p:nvGrpSpPr>
+        <p:cNvPr id="1" name=""/>
+        <p:cNvGrpSpPr/>
+        <p:nvPr/>
+      </p:nvGrpSpPr>
+      <p:grpSpPr>
+        <a:xfrm>
+          <a:off x="0" y="0"/>
+          <a:ext cx="0" cy="0"/>
+          <a:chOff x="0" y="0"/>
+          <a:chExt cx="0" cy="0"/>
+        </a:xfrm>
+      </p:grpSpPr>
+      <p:pic>
+        <p:nvPicPr>
+          <p:cNvPr id="4" name="Picture 3">
+            <a:extLst>
+              <a:ext uri="{FF2B5EF4-FFF2-40B4-BE49-F238E27FC236}">
+                <a16:creationId xmlns:a16="http://schemas.microsoft.com/office/drawing/2014/main" id="{AFCAC7B8-A8C2-47F5-9161-03914FCABC59}"/>
+              </a:ext>
+            </a:extLst>
+          </p:cNvPr>
+          <p:cNvPicPr>
+            <a:picLocks noChangeAspect="1"/>
+          </p:cNvPicPr>
+          <p:nvPr/>
+        </p:nvPicPr>
+        <p:blipFill>
+          <a:blip r:embed="rId3"/>
+          <a:stretch>
+            <a:fillRect/>
+          </a:stretch>
+        </p:blipFill>
+        <p:spPr>
+          <a:xfrm>
+            <a:off x="857408" y="397096"/>
+            <a:ext cx="10477183" cy="5891944"/>
+          </a:xfrm>
+          <a:prstGeom prst="rect">
+            <a:avLst/>
+          </a:prstGeom>
+        </p:spPr>
+      </p:pic>
+      <p:sp>
+        <p:nvSpPr>
+          <p:cNvPr id="5" name="TextBox 4">
+            <a:extLst>
+              <a:ext uri="{FF2B5EF4-FFF2-40B4-BE49-F238E27FC236}">
+                <a16:creationId xmlns:a16="http://schemas.microsoft.com/office/drawing/2014/main" id="{D80FBFA8-4397-4ECC-897D-ED1CD9EEB857}"/>
+              </a:ext>
+            </a:extLst>
+          </p:cNvPr>
+          <p:cNvSpPr txBox="1"/>
+          <p:nvPr/>
+        </p:nvSpPr>
+        <p:spPr>
+          <a:xfrm>
+            <a:off x="655320" y="6217920"/>
+            <a:ext cx="3285515" cy="369332"/>
+          </a:xfrm>
+          <a:prstGeom prst="rect">
+            <a:avLst/>
+          </a:prstGeom>
+          <a:noFill/>
+        </p:spPr>
+        <p:txBody>
+          <a:bodyPr wrap="none" rtlCol="0">
+            <a:spAutoFit/>
+          </a:bodyPr>
+          <a:lstStyle/>
+          <a:p>
+            <a:r>
+              <a:rPr lang="en-US" dirty="0"/>
+              <a:t>Secrets of the </a:t>
+            </a:r>
+            <a:r>
+              <a:rPr lang="en-US" dirty="0" err="1"/>
+              <a:t>Javascript</a:t>
+            </a:r>
+            <a:r>
+              <a:rPr lang="en-US" dirty="0"/>
+              <a:t> Ninja’s…</a:t>
+            </a:r>
+          </a:p>
+        </p:txBody>
+      </p:sp>
+    </p:spTree>
+    <p:extLst>
+      <p:ext uri="{BB962C8B-B14F-4D97-AF65-F5344CB8AC3E}">
+        <p14:creationId xmlns:p14="http://schemas.microsoft.com/office/powerpoint/2010/main" val="4082072226"/>
+      </p:ext>
+    </p:extLst>
+  </p:cSld>
+  <p:clrMapOvr>
+    <a:masterClrMapping/>
+  </p:clrMapOvr>
+</p:sld>
+</file>
+
+<file path=ppt/slides/slide12.xml><?xml version="1.0" encoding="utf-8"?>
+<p:sld xmlns:a="http://schemas.openxmlformats.org/drawingml/2006/main" xmlns:r="http://schemas.openxmlformats.org/officeDocument/2006/relationships" xmlns:p="http://schemas.openxmlformats.org/presentationml/2006/main">
+  <p:cSld>
+    <p:spTree>
+      <p:nvGrpSpPr>
+        <p:cNvPr id="1" name=""/>
+        <p:cNvGrpSpPr/>
+        <p:nvPr/>
+      </p:nvGrpSpPr>
+      <p:grpSpPr>
+        <a:xfrm>
+          <a:off x="0" y="0"/>
+          <a:ext cx="0" cy="0"/>
+          <a:chOff x="0" y="0"/>
+          <a:chExt cx="0" cy="0"/>
+        </a:xfrm>
+      </p:grpSpPr>
+      <p:sp>
+        <p:nvSpPr>
+          <p:cNvPr id="4" name="Rectangle 3">
+            <a:extLst>
+              <a:ext uri="{FF2B5EF4-FFF2-40B4-BE49-F238E27FC236}">
+                <a16:creationId xmlns:a16="http://schemas.microsoft.com/office/drawing/2014/main" id="{A45C005B-90B4-423D-BC39-83FC5B7A8603}"/>
+              </a:ext>
+            </a:extLst>
+          </p:cNvPr>
+          <p:cNvSpPr/>
+          <p:nvPr/>
+        </p:nvSpPr>
+        <p:spPr>
+          <a:xfrm>
+            <a:off x="3058160" y="6448475"/>
+            <a:ext cx="9997440" cy="369332"/>
+          </a:xfrm>
+          <a:prstGeom prst="rect">
+            <a:avLst/>
+          </a:prstGeom>
+        </p:spPr>
+        <p:txBody>
+          <a:bodyPr wrap="square">
+            <a:spAutoFit/>
+          </a:bodyPr>
+          <a:lstStyle/>
+          <a:p>
+            <a:r>
+              <a:rPr lang="en-US" dirty="0"/>
+              <a:t>https://developer.mozilla.org/en-US/docs/Web/JavaScript/Reference/Statements/let</a:t>
+            </a:r>
+          </a:p>
+        </p:txBody>
+      </p:sp>
+      <p:sp>
+        <p:nvSpPr>
+          <p:cNvPr id="5" name="TextBox 4">
+            <a:extLst>
+              <a:ext uri="{FF2B5EF4-FFF2-40B4-BE49-F238E27FC236}">
+                <a16:creationId xmlns:a16="http://schemas.microsoft.com/office/drawing/2014/main" id="{3936C706-889C-4BF9-9E98-7786CD6FAFA2}"/>
+              </a:ext>
+            </a:extLst>
+          </p:cNvPr>
+          <p:cNvSpPr txBox="1"/>
+          <p:nvPr/>
+        </p:nvSpPr>
+        <p:spPr>
+          <a:xfrm>
+            <a:off x="706120" y="254000"/>
+            <a:ext cx="9013686" cy="369332"/>
+          </a:xfrm>
+          <a:prstGeom prst="rect">
+            <a:avLst/>
+          </a:prstGeom>
+          <a:noFill/>
+        </p:spPr>
+        <p:txBody>
+          <a:bodyPr wrap="none" rtlCol="0">
+            <a:spAutoFit/>
+          </a:bodyPr>
+          <a:lstStyle/>
+          <a:p>
+            <a:r>
+              <a:rPr lang="en-US" dirty="0"/>
+              <a:t>If you want to attach a function to each item it a list with closures, the easiest way is with “let”</a:t>
+            </a:r>
+          </a:p>
+        </p:txBody>
+      </p:sp>
+      <p:pic>
+        <p:nvPicPr>
+          <p:cNvPr id="6" name="Picture 5">
+            <a:extLst>
+              <a:ext uri="{FF2B5EF4-FFF2-40B4-BE49-F238E27FC236}">
+                <a16:creationId xmlns:a16="http://schemas.microsoft.com/office/drawing/2014/main" id="{882C34B3-8298-45A6-9A8E-2DCEDC3E8530}"/>
+              </a:ext>
+            </a:extLst>
+          </p:cNvPr>
+          <p:cNvPicPr>
+            <a:picLocks noChangeAspect="1"/>
+          </p:cNvPicPr>
+          <p:nvPr/>
+        </p:nvPicPr>
+        <p:blipFill>
+          <a:blip r:embed="rId2"/>
+          <a:stretch>
+            <a:fillRect/>
+          </a:stretch>
+        </p:blipFill>
+        <p:spPr>
+          <a:xfrm>
+            <a:off x="1016000" y="829593"/>
+            <a:ext cx="9448800" cy="4871600"/>
+          </a:xfrm>
+          <a:prstGeom prst="rect">
+            <a:avLst/>
+          </a:prstGeom>
+        </p:spPr>
+      </p:pic>
+    </p:spTree>
+    <p:extLst>
+      <p:ext uri="{BB962C8B-B14F-4D97-AF65-F5344CB8AC3E}">
+        <p14:creationId xmlns:p14="http://schemas.microsoft.com/office/powerpoint/2010/main" val="4074157855"/>
+      </p:ext>
+    </p:extLst>
+  </p:cSld>
+  <p:clrMapOvr>
+    <a:masterClrMapping/>
+  </p:clrMapOvr>
+</p:sld>
+</file>
+
+<file path=ppt/slides/slide13.xml><?xml version="1.0" encoding="utf-8"?>
+<p:sld xmlns:a="http://schemas.openxmlformats.org/drawingml/2006/main" xmlns:r="http://schemas.openxmlformats.org/officeDocument/2006/relationships" xmlns:p="http://schemas.openxmlformats.org/presentationml/2006/main">
+  <p:cSld>
+    <p:spTree>
+      <p:nvGrpSpPr>
+        <p:cNvPr id="1" name=""/>
+        <p:cNvGrpSpPr/>
+        <p:nvPr/>
+      </p:nvGrpSpPr>
+      <p:grpSpPr>
+        <a:xfrm>
+          <a:off x="0" y="0"/>
+          <a:ext cx="0" cy="0"/>
+          <a:chOff x="0" y="0"/>
+          <a:chExt cx="0" cy="0"/>
+        </a:xfrm>
+      </p:grpSpPr>
+      <p:sp>
+        <p:nvSpPr>
+          <p:cNvPr id="4" name="TextBox 3">
+            <a:extLst>
+              <a:ext uri="{FF2B5EF4-FFF2-40B4-BE49-F238E27FC236}">
+                <a16:creationId xmlns:a16="http://schemas.microsoft.com/office/drawing/2014/main" id="{4847DE78-8545-4F10-8BCA-91FAD6883876}"/>
+              </a:ext>
+            </a:extLst>
+          </p:cNvPr>
+          <p:cNvSpPr txBox="1"/>
+          <p:nvPr/>
+        </p:nvSpPr>
+        <p:spPr>
+          <a:xfrm>
+            <a:off x="650240" y="71120"/>
+            <a:ext cx="7617855" cy="369332"/>
+          </a:xfrm>
+          <a:prstGeom prst="rect">
+            <a:avLst/>
+          </a:prstGeom>
+          <a:noFill/>
+        </p:spPr>
+        <p:txBody>
+          <a:bodyPr wrap="none" rtlCol="0">
+            <a:spAutoFit/>
+          </a:bodyPr>
+          <a:lstStyle/>
+          <a:p>
+            <a:r>
+              <a:rPr lang="en-US" dirty="0"/>
+              <a:t>Using </a:t>
+            </a:r>
+            <a:r>
+              <a:rPr lang="en-US" dirty="0" err="1"/>
+              <a:t>var</a:t>
+            </a:r>
+            <a:r>
+              <a:rPr lang="en-US" dirty="0"/>
+              <a:t> you kind of have to tie yourself in knots to find an appropriate scope…</a:t>
+            </a:r>
+          </a:p>
+        </p:txBody>
+      </p:sp>
+      <p:pic>
+        <p:nvPicPr>
+          <p:cNvPr id="5" name="Picture 4">
+            <a:extLst>
+              <a:ext uri="{FF2B5EF4-FFF2-40B4-BE49-F238E27FC236}">
+                <a16:creationId xmlns:a16="http://schemas.microsoft.com/office/drawing/2014/main" id="{5AE04D2E-242D-463C-B215-0BEE6E9454CD}"/>
+              </a:ext>
+            </a:extLst>
+          </p:cNvPr>
+          <p:cNvPicPr>
+            <a:picLocks noChangeAspect="1"/>
+          </p:cNvPicPr>
+          <p:nvPr/>
+        </p:nvPicPr>
+        <p:blipFill>
+          <a:blip r:embed="rId2"/>
+          <a:stretch>
+            <a:fillRect/>
+          </a:stretch>
+        </p:blipFill>
+        <p:spPr>
+          <a:xfrm>
+            <a:off x="793395" y="567485"/>
+            <a:ext cx="9236579" cy="5950155"/>
+          </a:xfrm>
+          <a:prstGeom prst="rect">
+            <a:avLst/>
+          </a:prstGeom>
+        </p:spPr>
+      </p:pic>
+      <p:sp>
+        <p:nvSpPr>
+          <p:cNvPr id="7" name="Rectangle 6">
+            <a:extLst>
+              <a:ext uri="{FF2B5EF4-FFF2-40B4-BE49-F238E27FC236}">
+                <a16:creationId xmlns:a16="http://schemas.microsoft.com/office/drawing/2014/main" id="{A3BCD741-EC3A-4704-AC27-E0DEF5ADD122}"/>
+              </a:ext>
+            </a:extLst>
+          </p:cNvPr>
+          <p:cNvSpPr/>
+          <p:nvPr/>
+        </p:nvSpPr>
+        <p:spPr>
+          <a:xfrm>
+            <a:off x="3418840" y="6458635"/>
+            <a:ext cx="9997440" cy="369332"/>
+          </a:xfrm>
+          <a:prstGeom prst="rect">
+            <a:avLst/>
+          </a:prstGeom>
+        </p:spPr>
+        <p:txBody>
+          <a:bodyPr wrap="square">
+            <a:spAutoFit/>
+          </a:bodyPr>
+          <a:lstStyle/>
+          <a:p>
+            <a:r>
+              <a:rPr lang="en-US" dirty="0"/>
+              <a:t>https://developer.mozilla.org/en-US/docs/Web/JavaScript/Reference/Statements/let</a:t>
+            </a:r>
+          </a:p>
+        </p:txBody>
+      </p:sp>
+    </p:spTree>
+    <p:extLst>
+      <p:ext uri="{BB962C8B-B14F-4D97-AF65-F5344CB8AC3E}">
+        <p14:creationId xmlns:p14="http://schemas.microsoft.com/office/powerpoint/2010/main" val="186002320"/>
+      </p:ext>
+    </p:extLst>
+  </p:cSld>
+  <p:clrMapOvr>
+    <a:masterClrMapping/>
+  </p:clrMapOvr>
+</p:sld>
+</file>
+
+<file path=ppt/slides/slide14.xml><?xml version="1.0" encoding="utf-8"?>
+<p:sld xmlns:a="http://schemas.openxmlformats.org/drawingml/2006/main" xmlns:r="http://schemas.openxmlformats.org/officeDocument/2006/relationships" xmlns:p="http://schemas.openxmlformats.org/presentationml/2006/main">
+  <p:cSld>
+    <p:spTree>
+      <p:nvGrpSpPr>
+        <p:cNvPr id="1" name=""/>
+        <p:cNvGrpSpPr/>
+        <p:nvPr/>
+      </p:nvGrpSpPr>
+      <p:grpSpPr>
+        <a:xfrm>
+          <a:off x="0" y="0"/>
+          <a:ext cx="0" cy="0"/>
+          <a:chOff x="0" y="0"/>
+          <a:chExt cx="0" cy="0"/>
+        </a:xfrm>
+      </p:grpSpPr>
+      <p:sp>
+        <p:nvSpPr>
+          <p:cNvPr id="4" name="TextBox 3">
+            <a:extLst>
+              <a:ext uri="{FF2B5EF4-FFF2-40B4-BE49-F238E27FC236}">
+                <a16:creationId xmlns:a16="http://schemas.microsoft.com/office/drawing/2014/main" id="{553244A8-AA9C-41BB-AC45-7FD879CBF8F4}"/>
+              </a:ext>
+            </a:extLst>
+          </p:cNvPr>
+          <p:cNvSpPr txBox="1"/>
+          <p:nvPr/>
+        </p:nvSpPr>
+        <p:spPr>
+          <a:xfrm>
+            <a:off x="695960" y="15240"/>
+            <a:ext cx="8631594" cy="369332"/>
+          </a:xfrm>
+          <a:prstGeom prst="rect">
+            <a:avLst/>
+          </a:prstGeom>
+          <a:noFill/>
+        </p:spPr>
+        <p:txBody>
+          <a:bodyPr wrap="none" rtlCol="0">
+            <a:spAutoFit/>
+          </a:bodyPr>
+          <a:lstStyle/>
+          <a:p>
+            <a:r>
+              <a:rPr lang="en-US" dirty="0"/>
+              <a:t>Closures can be used to make functions have the equivalent of private instance variables….</a:t>
+            </a:r>
+          </a:p>
+        </p:txBody>
+      </p:sp>
+      <p:pic>
+        <p:nvPicPr>
+          <p:cNvPr id="5" name="Picture 4">
+            <a:extLst>
+              <a:ext uri="{FF2B5EF4-FFF2-40B4-BE49-F238E27FC236}">
+                <a16:creationId xmlns:a16="http://schemas.microsoft.com/office/drawing/2014/main" id="{843991AE-FD71-4355-87D6-80E5EFA01356}"/>
+              </a:ext>
+            </a:extLst>
+          </p:cNvPr>
+          <p:cNvPicPr>
+            <a:picLocks noChangeAspect="1"/>
+          </p:cNvPicPr>
+          <p:nvPr/>
+        </p:nvPicPr>
+        <p:blipFill>
+          <a:blip r:embed="rId2"/>
+          <a:stretch>
+            <a:fillRect/>
+          </a:stretch>
+        </p:blipFill>
+        <p:spPr>
+          <a:xfrm>
+            <a:off x="729135" y="396240"/>
+            <a:ext cx="10055706" cy="5993628"/>
+          </a:xfrm>
+          <a:prstGeom prst="rect">
+            <a:avLst/>
+          </a:prstGeom>
+        </p:spPr>
+      </p:pic>
+      <p:sp>
+        <p:nvSpPr>
+          <p:cNvPr id="6" name="TextBox 5">
+            <a:extLst>
+              <a:ext uri="{FF2B5EF4-FFF2-40B4-BE49-F238E27FC236}">
+                <a16:creationId xmlns:a16="http://schemas.microsoft.com/office/drawing/2014/main" id="{FEE33D71-847D-42B5-90DC-C29229D1100E}"/>
+              </a:ext>
+            </a:extLst>
+          </p:cNvPr>
+          <p:cNvSpPr txBox="1"/>
+          <p:nvPr/>
+        </p:nvSpPr>
+        <p:spPr>
+          <a:xfrm>
+            <a:off x="1117600" y="6421120"/>
+            <a:ext cx="3041538" cy="369332"/>
+          </a:xfrm>
+          <a:prstGeom prst="rect">
+            <a:avLst/>
+          </a:prstGeom>
+          <a:noFill/>
+        </p:spPr>
+        <p:txBody>
+          <a:bodyPr wrap="none" rtlCol="0">
+            <a:spAutoFit/>
+          </a:bodyPr>
+          <a:lstStyle/>
+          <a:p>
+            <a:r>
+              <a:rPr lang="en-US" dirty="0"/>
+              <a:t>Secrets of the </a:t>
+            </a:r>
+            <a:r>
+              <a:rPr lang="en-US" dirty="0" err="1"/>
+              <a:t>Javascript</a:t>
+            </a:r>
+            <a:r>
+              <a:rPr lang="en-US" dirty="0"/>
+              <a:t> ninjas</a:t>
+            </a:r>
+          </a:p>
+        </p:txBody>
+      </p:sp>
+    </p:spTree>
+    <p:extLst>
+      <p:ext uri="{BB962C8B-B14F-4D97-AF65-F5344CB8AC3E}">
+        <p14:creationId xmlns:p14="http://schemas.microsoft.com/office/powerpoint/2010/main" val="2670669281"/>
+      </p:ext>
+    </p:extLst>
+  </p:cSld>
+  <p:clrMapOvr>
+    <a:masterClrMapping/>
+  </p:clrMapOvr>
+</p:sld>
+</file>
+
+<file path=ppt/slides/slide15.xml><?xml version="1.0" encoding="utf-8"?>
+<p:sld xmlns:a="http://schemas.openxmlformats.org/drawingml/2006/main" xmlns:r="http://schemas.openxmlformats.org/officeDocument/2006/relationships" xmlns:p="http://schemas.openxmlformats.org/presentationml/2006/main">
+  <p:cSld>
+    <p:spTree>
+      <p:nvGrpSpPr>
+        <p:cNvPr id="1" name=""/>
+        <p:cNvGrpSpPr/>
+        <p:nvPr/>
+      </p:nvGrpSpPr>
+      <p:grpSpPr>
+        <a:xfrm>
+          <a:off x="0" y="0"/>
+          <a:ext cx="0" cy="0"/>
+          <a:chOff x="0" y="0"/>
+          <a:chExt cx="0" cy="0"/>
+        </a:xfrm>
+      </p:grpSpPr>
+      <p:sp>
+        <p:nvSpPr>
+          <p:cNvPr id="4" name="TextBox 3">
+            <a:extLst>
+              <a:ext uri="{FF2B5EF4-FFF2-40B4-BE49-F238E27FC236}">
+                <a16:creationId xmlns:a16="http://schemas.microsoft.com/office/drawing/2014/main" id="{2E7CBA97-ECEB-4826-A78C-4310300E4FE9}"/>
+              </a:ext>
+            </a:extLst>
+          </p:cNvPr>
+          <p:cNvSpPr txBox="1"/>
+          <p:nvPr/>
+        </p:nvSpPr>
+        <p:spPr>
+          <a:xfrm>
+            <a:off x="822960" y="340360"/>
+            <a:ext cx="5863400" cy="923330"/>
+          </a:xfrm>
+          <a:prstGeom prst="rect">
+            <a:avLst/>
+          </a:prstGeom>
+          <a:noFill/>
+        </p:spPr>
+        <p:txBody>
+          <a:bodyPr wrap="none" rtlCol="0">
+            <a:spAutoFit/>
+          </a:bodyPr>
+          <a:lstStyle/>
+          <a:p>
+            <a:r>
+              <a:rPr lang="en-US" dirty="0"/>
+              <a:t>Scoping in </a:t>
+            </a:r>
+            <a:r>
+              <a:rPr lang="en-US" dirty="0" err="1"/>
+              <a:t>Javascript</a:t>
+            </a:r>
+            <a:endParaRPr lang="en-US" dirty="0"/>
+          </a:p>
+          <a:p>
+            <a:r>
+              <a:rPr lang="en-US" dirty="0"/>
+              <a:t>Closures are central to </a:t>
+            </a:r>
+            <a:r>
+              <a:rPr lang="en-US" dirty="0" err="1"/>
+              <a:t>javascript</a:t>
+            </a:r>
+            <a:r>
+              <a:rPr lang="en-US" dirty="0"/>
+              <a:t> and allow for encapsulation</a:t>
+            </a:r>
+          </a:p>
+          <a:p>
+            <a:r>
+              <a:rPr lang="en-US" dirty="0" err="1"/>
+              <a:t>Javascript</a:t>
+            </a:r>
+            <a:r>
+              <a:rPr lang="en-US" dirty="0"/>
+              <a:t> is single-threaded</a:t>
+            </a:r>
+          </a:p>
+        </p:txBody>
+      </p:sp>
+      <p:cxnSp>
+        <p:nvCxnSpPr>
+          <p:cNvPr id="5" name="Straight Arrow Connector 4">
+            <a:extLst>
+              <a:ext uri="{FF2B5EF4-FFF2-40B4-BE49-F238E27FC236}">
+                <a16:creationId xmlns:a16="http://schemas.microsoft.com/office/drawing/2014/main" id="{40CD0825-9976-4E6D-BD80-6F9EC280F175}"/>
+              </a:ext>
+            </a:extLst>
+          </p:cNvPr>
+          <p:cNvCxnSpPr/>
+          <p:nvPr/>
+        </p:nvCxnSpPr>
+        <p:spPr>
+          <a:xfrm flipH="1">
+            <a:off x="3601720" y="1082040"/>
+            <a:ext cx="1112520" cy="0"/>
+          </a:xfrm>
+          <a:prstGeom prst="straightConnector1">
+            <a:avLst/>
+          </a:prstGeom>
+          <a:ln>
+            <a:tailEnd type="triangle"/>
+          </a:ln>
+        </p:spPr>
+        <p:style>
+          <a:lnRef idx="1">
+            <a:schemeClr val="accent1"/>
+          </a:lnRef>
+          <a:fillRef idx="0">
+            <a:schemeClr val="accent1"/>
+          </a:fillRef>
+          <a:effectRef idx="0">
+            <a:schemeClr val="accent1"/>
+          </a:effectRef>
+          <a:fontRef idx="minor">
+            <a:schemeClr val="tx1"/>
+          </a:fontRef>
+        </p:style>
+      </p:cxnSp>
+    </p:spTree>
+    <p:extLst>
+      <p:ext uri="{BB962C8B-B14F-4D97-AF65-F5344CB8AC3E}">
+        <p14:creationId xmlns:p14="http://schemas.microsoft.com/office/powerpoint/2010/main" val="2068644072"/>
+      </p:ext>
+    </p:extLst>
+  </p:cSld>
+  <p:clrMapOvr>
+    <a:masterClrMapping/>
+  </p:clrMapOvr>
+</p:sld>
+</file>
+
+<file path=ppt/slides/slide16.xml><?xml version="1.0" encoding="utf-8"?>
+<p:sld xmlns:a="http://schemas.openxmlformats.org/drawingml/2006/main" xmlns:r="http://schemas.openxmlformats.org/officeDocument/2006/relationships" xmlns:p="http://schemas.openxmlformats.org/presentationml/2006/main">
+  <p:cSld>
+    <p:spTree>
+      <p:nvGrpSpPr>
+        <p:cNvPr id="1" name=""/>
+        <p:cNvGrpSpPr/>
+        <p:nvPr/>
+      </p:nvGrpSpPr>
+      <p:grpSpPr>
+        <a:xfrm>
+          <a:off x="0" y="0"/>
+          <a:ext cx="0" cy="0"/>
+          <a:chOff x="0" y="0"/>
+          <a:chExt cx="0" cy="0"/>
+        </a:xfrm>
+      </p:grpSpPr>
+      <p:sp>
+        <p:nvSpPr>
+          <p:cNvPr id="5" name="TextBox 4">
+            <a:extLst>
+              <a:ext uri="{FF2B5EF4-FFF2-40B4-BE49-F238E27FC236}">
+                <a16:creationId xmlns:a16="http://schemas.microsoft.com/office/drawing/2014/main" id="{50CFFE79-2988-4670-AF26-46758DEE4D06}"/>
+              </a:ext>
+            </a:extLst>
+          </p:cNvPr>
+          <p:cNvSpPr txBox="1"/>
+          <p:nvPr/>
+        </p:nvSpPr>
+        <p:spPr>
+          <a:xfrm>
+            <a:off x="751840" y="228600"/>
+            <a:ext cx="9494907" cy="3139321"/>
+          </a:xfrm>
+          <a:prstGeom prst="rect">
+            <a:avLst/>
+          </a:prstGeom>
+          <a:noFill/>
+        </p:spPr>
+        <p:txBody>
+          <a:bodyPr wrap="none" rtlCol="0">
+            <a:spAutoFit/>
+          </a:bodyPr>
+          <a:lstStyle/>
+          <a:p>
+            <a:r>
+              <a:rPr lang="en-US" dirty="0" err="1"/>
+              <a:t>Javascript</a:t>
+            </a:r>
+            <a:r>
+              <a:rPr lang="en-US" dirty="0"/>
+              <a:t> does not allow multiple threads to share access to mutable data.</a:t>
+            </a:r>
+          </a:p>
+          <a:p>
+            <a:endParaRPr lang="en-US" dirty="0"/>
+          </a:p>
+          <a:p>
+            <a:r>
+              <a:rPr lang="en-US" dirty="0"/>
+              <a:t>There is no equivalent to new Thread().start().</a:t>
+            </a:r>
+          </a:p>
+          <a:p>
+            <a:endParaRPr lang="en-US" dirty="0"/>
+          </a:p>
+          <a:p>
+            <a:r>
+              <a:rPr lang="en-US" dirty="0"/>
+              <a:t>There are no Semaphores or other methods for </a:t>
+            </a:r>
+            <a:r>
+              <a:rPr lang="en-US" dirty="0" err="1"/>
+              <a:t>co-ordinating</a:t>
+            </a:r>
+            <a:r>
+              <a:rPr lang="en-US" dirty="0"/>
+              <a:t> multiple threads.</a:t>
+            </a:r>
+          </a:p>
+          <a:p>
+            <a:endParaRPr lang="en-US" dirty="0"/>
+          </a:p>
+          <a:p>
+            <a:r>
+              <a:rPr lang="en-US" dirty="0"/>
+              <a:t>“Everything is multi-threaded except your code:</a:t>
+            </a:r>
+          </a:p>
+          <a:p>
+            <a:endParaRPr lang="en-US" dirty="0"/>
+          </a:p>
+          <a:p>
+            <a:r>
+              <a:rPr lang="en-US" dirty="0"/>
+              <a:t>However, </a:t>
+            </a:r>
+            <a:r>
+              <a:rPr lang="en-US" dirty="0" err="1"/>
+              <a:t>javascript</a:t>
+            </a:r>
+            <a:r>
+              <a:rPr lang="en-US" dirty="0"/>
+              <a:t> can still manage multiple events via the use of closures and callback functions…</a:t>
+            </a:r>
+          </a:p>
+          <a:p>
+            <a:endParaRPr lang="en-US" dirty="0"/>
+          </a:p>
+          <a:p>
+            <a:endParaRPr lang="en-US" dirty="0"/>
+          </a:p>
+        </p:txBody>
+      </p:sp>
+    </p:spTree>
+    <p:extLst>
+      <p:ext uri="{BB962C8B-B14F-4D97-AF65-F5344CB8AC3E}">
+        <p14:creationId xmlns:p14="http://schemas.microsoft.com/office/powerpoint/2010/main" val="3854446632"/>
       </p:ext>
     </p:extLst>
   </p:cSld>
@@ -5131,4 +6483,299 @@
     </a:ext>
   </a:extLst>
 </a:theme>
+</file>
+
+<file path=ppt/theme/theme2.xml><?xml version="1.0" encoding="utf-8"?>
+<a:theme xmlns:a="http://schemas.openxmlformats.org/drawingml/2006/main" name="Office Theme">
+  <a:themeElements>
+    <a:clrScheme name="Office">
+      <a:dk1>
+        <a:sysClr val="windowText" lastClr="000000"/>
+      </a:dk1>
+      <a:lt1>
+        <a:sysClr val="window" lastClr="FFFFFF"/>
+      </a:lt1>
+      <a:dk2>
+        <a:srgbClr val="44546A"/>
+      </a:dk2>
+      <a:lt2>
+        <a:srgbClr val="E7E6E6"/>
+      </a:lt2>
+      <a:accent1>
+        <a:srgbClr val="4472C4"/>
+      </a:accent1>
+      <a:accent2>
+        <a:srgbClr val="ED7D31"/>
+      </a:accent2>
+      <a:accent3>
+        <a:srgbClr val="A5A5A5"/>
+      </a:accent3>
+      <a:accent4>
+        <a:srgbClr val="FFC000"/>
+      </a:accent4>
+      <a:accent5>
+        <a:srgbClr val="5B9BD5"/>
+      </a:accent5>
+      <a:accent6>
+        <a:srgbClr val="70AD47"/>
+      </a:accent6>
+      <a:hlink>
+        <a:srgbClr val="0563C1"/>
+      </a:hlink>
+      <a:folHlink>
+        <a:srgbClr val="954F72"/>
+      </a:folHlink>
+    </a:clrScheme>
+    <a:fontScheme name="Office">
+      <a:majorFont>
+        <a:latin typeface="Calibri Light" panose="020F0302020204030204"/>
+        <a:ea typeface=""/>
+        <a:cs typeface=""/>
+        <a:font script="Jpan" typeface="游ゴシック Light"/>
+        <a:font script="Hang" typeface="맑은 고딕"/>
+        <a:font script="Hans" typeface="等线 Light"/>
+        <a:font script="Hant" typeface="新細明體"/>
+        <a:font script="Arab" typeface="Times New Roman"/>
+        <a:font script="Hebr" typeface="Times New Roman"/>
+        <a:font script="Thai" typeface="Angsana New"/>
+        <a:font script="Ethi" typeface="Nyala"/>
+        <a:font script="Beng" typeface="Vrinda"/>
+        <a:font script="Gujr" typeface="Shruti"/>
+        <a:font script="Khmr" typeface="MoolBoran"/>
+        <a:font script="Knda" typeface="Tunga"/>
+        <a:font script="Guru" typeface="Raavi"/>
+        <a:font script="Cans" typeface="Euphemia"/>
+        <a:font script="Cher" typeface="Plantagenet Cherokee"/>
+        <a:font script="Yiii" typeface="Microsoft Yi Baiti"/>
+        <a:font script="Tibt" typeface="Microsoft Himalaya"/>
+        <a:font script="Thaa" typeface="MV Boli"/>
+        <a:font script="Deva" typeface="Mangal"/>
+        <a:font script="Telu" typeface="Gautami"/>
+        <a:font script="Taml" typeface="Latha"/>
+        <a:font script="Syrc" typeface="Estrangelo Edessa"/>
+        <a:font script="Orya" typeface="Kalinga"/>
+        <a:font script="Mlym" typeface="Kartika"/>
+        <a:font script="Laoo" typeface="DokChampa"/>
+        <a:font script="Sinh" typeface="Iskoola Pota"/>
+        <a:font script="Mong" typeface="Mongolian Baiti"/>
+        <a:font script="Viet" typeface="Times New Roman"/>
+        <a:font script="Uigh" typeface="Microsoft Uighur"/>
+        <a:font script="Geor" typeface="Sylfaen"/>
+        <a:font script="Armn" typeface="Arial"/>
+        <a:font script="Bugi" typeface="Leelawadee UI"/>
+        <a:font script="Bopo" typeface="Microsoft JhengHei"/>
+        <a:font script="Java" typeface="Javanese Text"/>
+        <a:font script="Lisu" typeface="Segoe UI"/>
+        <a:font script="Mymr" typeface="Myanmar Text"/>
+        <a:font script="Nkoo" typeface="Ebrima"/>
+        <a:font script="Olck" typeface="Nirmala UI"/>
+        <a:font script="Osma" typeface="Ebrima"/>
+        <a:font script="Phag" typeface="Phagspa"/>
+        <a:font script="Syrn" typeface="Estrangelo Edessa"/>
+        <a:font script="Syrj" typeface="Estrangelo Edessa"/>
+        <a:font script="Syre" typeface="Estrangelo Edessa"/>
+        <a:font script="Sora" typeface="Nirmala UI"/>
+        <a:font script="Tale" typeface="Microsoft Tai Le"/>
+        <a:font script="Talu" typeface="Microsoft New Tai Lue"/>
+        <a:font script="Tfng" typeface="Ebrima"/>
+      </a:majorFont>
+      <a:minorFont>
+        <a:latin typeface="Calibri" panose="020F0502020204030204"/>
+        <a:ea typeface=""/>
+        <a:cs typeface=""/>
+        <a:font script="Jpan" typeface="游ゴシック"/>
+        <a:font script="Hang" typeface="맑은 고딕"/>
+        <a:font script="Hans" typeface="等线"/>
+        <a:font script="Hant" typeface="新細明體"/>
+        <a:font script="Arab" typeface="Arial"/>
+        <a:font script="Hebr" typeface="Arial"/>
+        <a:font script="Thai" typeface="Cordia New"/>
+        <a:font script="Ethi" typeface="Nyala"/>
+        <a:font script="Beng" typeface="Vrinda"/>
+        <a:font script="Gujr" typeface="Shruti"/>
+        <a:font script="Khmr" typeface="DaunPenh"/>
+        <a:font script="Knda" typeface="Tunga"/>
+        <a:font script="Guru" typeface="Raavi"/>
+        <a:font script="Cans" typeface="Euphemia"/>
+        <a:font script="Cher" typeface="Plantagenet Cherokee"/>
+        <a:font script="Yiii" typeface="Microsoft Yi Baiti"/>
+        <a:font script="Tibt" typeface="Microsoft Himalaya"/>
+        <a:font script="Thaa" typeface="MV Boli"/>
+        <a:font script="Deva" typeface="Mangal"/>
+        <a:font script="Telu" typeface="Gautami"/>
+        <a:font script="Taml" typeface="Latha"/>
+        <a:font script="Syrc" typeface="Estrangelo Edessa"/>
+        <a:font script="Orya" typeface="Kalinga"/>
+        <a:font script="Mlym" typeface="Kartika"/>
+        <a:font script="Laoo" typeface="DokChampa"/>
+        <a:font script="Sinh" typeface="Iskoola Pota"/>
+        <a:font script="Mong" typeface="Mongolian Baiti"/>
+        <a:font script="Viet" typeface="Arial"/>
+        <a:font script="Uigh" typeface="Microsoft Uighur"/>
+        <a:font script="Geor" typeface="Sylfaen"/>
+        <a:font script="Armn" typeface="Arial"/>
+        <a:font script="Bugi" typeface="Leelawadee UI"/>
+        <a:font script="Bopo" typeface="Microsoft JhengHei"/>
+        <a:font script="Java" typeface="Javanese Text"/>
+        <a:font script="Lisu" typeface="Segoe UI"/>
+        <a:font script="Mymr" typeface="Myanmar Text"/>
+        <a:font script="Nkoo" typeface="Ebrima"/>
+        <a:font script="Olck" typeface="Nirmala UI"/>
+        <a:font script="Osma" typeface="Ebrima"/>
+        <a:font script="Phag" typeface="Phagspa"/>
+        <a:font script="Syrn" typeface="Estrangelo Edessa"/>
+        <a:font script="Syrj" typeface="Estrangelo Edessa"/>
+        <a:font script="Syre" typeface="Estrangelo Edessa"/>
+        <a:font script="Sora" typeface="Nirmala UI"/>
+        <a:font script="Tale" typeface="Microsoft Tai Le"/>
+        <a:font script="Talu" typeface="Microsoft New Tai Lue"/>
+        <a:font script="Tfng" typeface="Ebrima"/>
+      </a:minorFont>
+    </a:fontScheme>
+    <a:fmtScheme name="Office">
+      <a:fillStyleLst>
+        <a:solidFill>
+          <a:schemeClr val="phClr"/>
+        </a:solidFill>
+        <a:gradFill rotWithShape="1">
+          <a:gsLst>
+            <a:gs pos="0">
+              <a:schemeClr val="phClr">
+                <a:lumMod val="110000"/>
+                <a:satMod val="105000"/>
+                <a:tint val="67000"/>
+              </a:schemeClr>
+            </a:gs>
+            <a:gs pos="50000">
+              <a:schemeClr val="phClr">
+                <a:lumMod val="105000"/>
+                <a:satMod val="103000"/>
+                <a:tint val="73000"/>
+              </a:schemeClr>
+            </a:gs>
+            <a:gs pos="100000">
+              <a:schemeClr val="phClr">
+                <a:lumMod val="105000"/>
+                <a:satMod val="109000"/>
+                <a:tint val="81000"/>
+              </a:schemeClr>
+            </a:gs>
+          </a:gsLst>
+          <a:lin ang="5400000" scaled="0"/>
+        </a:gradFill>
+        <a:gradFill rotWithShape="1">
+          <a:gsLst>
+            <a:gs pos="0">
+              <a:schemeClr val="phClr">
+                <a:satMod val="103000"/>
+                <a:lumMod val="102000"/>
+                <a:tint val="94000"/>
+              </a:schemeClr>
+            </a:gs>
+            <a:gs pos="50000">
+              <a:schemeClr val="phClr">
+                <a:satMod val="110000"/>
+                <a:lumMod val="100000"/>
+                <a:shade val="100000"/>
+              </a:schemeClr>
+            </a:gs>
+            <a:gs pos="100000">
+              <a:schemeClr val="phClr">
+                <a:lumMod val="99000"/>
+                <a:satMod val="120000"/>
+                <a:shade val="78000"/>
+              </a:schemeClr>
+            </a:gs>
+          </a:gsLst>
+          <a:lin ang="5400000" scaled="0"/>
+        </a:gradFill>
+      </a:fillStyleLst>
+      <a:lnStyleLst>
+        <a:ln w="6350" cap="flat" cmpd="sng" algn="ctr">
+          <a:solidFill>
+            <a:schemeClr val="phClr"/>
+          </a:solidFill>
+          <a:prstDash val="solid"/>
+          <a:miter lim="800000"/>
+        </a:ln>
+        <a:ln w="12700" cap="flat" cmpd="sng" algn="ctr">
+          <a:solidFill>
+            <a:schemeClr val="phClr"/>
+          </a:solidFill>
+          <a:prstDash val="solid"/>
+          <a:miter lim="800000"/>
+        </a:ln>
+        <a:ln w="19050" cap="flat" cmpd="sng" algn="ctr">
+          <a:solidFill>
+            <a:schemeClr val="phClr"/>
+          </a:solidFill>
+          <a:prstDash val="solid"/>
+          <a:miter lim="800000"/>
+        </a:ln>
+      </a:lnStyleLst>
+      <a:effectStyleLst>
+        <a:effectStyle>
+          <a:effectLst/>
+        </a:effectStyle>
+        <a:effectStyle>
+          <a:effectLst/>
+        </a:effectStyle>
+        <a:effectStyle>
+          <a:effectLst>
+            <a:outerShdw blurRad="57150" dist="19050" dir="5400000" algn="ctr" rotWithShape="0">
+              <a:srgbClr val="000000">
+                <a:alpha val="63000"/>
+              </a:srgbClr>
+            </a:outerShdw>
+          </a:effectLst>
+        </a:effectStyle>
+      </a:effectStyleLst>
+      <a:bgFillStyleLst>
+        <a:solidFill>
+          <a:schemeClr val="phClr"/>
+        </a:solidFill>
+        <a:solidFill>
+          <a:schemeClr val="phClr">
+            <a:tint val="95000"/>
+            <a:satMod val="170000"/>
+          </a:schemeClr>
+        </a:solidFill>
+        <a:gradFill rotWithShape="1">
+          <a:gsLst>
+            <a:gs pos="0">
+              <a:schemeClr val="phClr">
+                <a:tint val="93000"/>
+                <a:satMod val="150000"/>
+                <a:shade val="98000"/>
+                <a:lumMod val="102000"/>
+              </a:schemeClr>
+            </a:gs>
+            <a:gs pos="50000">
+              <a:schemeClr val="phClr">
+                <a:tint val="98000"/>
+                <a:satMod val="130000"/>
+                <a:shade val="90000"/>
+                <a:lumMod val="103000"/>
+              </a:schemeClr>
+            </a:gs>
+            <a:gs pos="100000">
+              <a:schemeClr val="phClr">
+                <a:shade val="63000"/>
+                <a:satMod val="120000"/>
+              </a:schemeClr>
+            </a:gs>
+          </a:gsLst>
+          <a:lin ang="5400000" scaled="0"/>
+        </a:gradFill>
+      </a:bgFillStyleLst>
+    </a:fmtScheme>
+  </a:themeElements>
+  <a:objectDefaults/>
+  <a:extraClrSchemeLst/>
+  <a:extLst>
+    <a:ext uri="{05A4C25C-085E-4340-85A3-A5531E510DB2}">
+      <thm15:themeFamily xmlns:thm15="http://schemas.microsoft.com/office/thememl/2012/main" name="Office Theme" id="{62F939B6-93AF-4DB8-9C6B-D6C7DFDC589F}" vid="{4A3C46E8-61CC-4603-A589-7422A47A8E4A}"/>
+    </a:ext>
+  </a:extLst>
+</a:theme>
 </file>
</xml_diff>

<commit_message>
add citation for lecture 25
</commit_message>
<xml_diff>
--- a/classes/prog2017/Prog3-Lecture25.pptx
+++ b/classes/prog2017/Prog3-Lecture25.pptx
@@ -735,6 +735,90 @@
     <p:extLst>
       <p:ext uri="{BB962C8B-B14F-4D97-AF65-F5344CB8AC3E}">
         <p14:creationId xmlns:p14="http://schemas.microsoft.com/office/powerpoint/2010/main" val="2052126492"/>
+      </p:ext>
+    </p:extLst>
+  </p:cSld>
+  <p:clrMapOvr>
+    <a:masterClrMapping/>
+  </p:clrMapOvr>
+</p:notes>
+</file>
+
+<file path=ppt/notesSlides/notesSlide4.xml><?xml version="1.0" encoding="utf-8"?>
+<p:notes xmlns:a="http://schemas.openxmlformats.org/drawingml/2006/main" xmlns:r="http://schemas.openxmlformats.org/officeDocument/2006/relationships" xmlns:p="http://schemas.openxmlformats.org/presentationml/2006/main">
+  <p:cSld>
+    <p:spTree>
+      <p:nvGrpSpPr>
+        <p:cNvPr id="1" name=""/>
+        <p:cNvGrpSpPr/>
+        <p:nvPr/>
+      </p:nvGrpSpPr>
+      <p:grpSpPr>
+        <a:xfrm>
+          <a:off x="0" y="0"/>
+          <a:ext cx="0" cy="0"/>
+          <a:chOff x="0" y="0"/>
+          <a:chExt cx="0" cy="0"/>
+        </a:xfrm>
+      </p:grpSpPr>
+      <p:sp>
+        <p:nvSpPr>
+          <p:cNvPr id="2" name="Slide Image Placeholder 1"/>
+          <p:cNvSpPr>
+            <a:spLocks noGrp="1" noRot="1" noChangeAspect="1"/>
+          </p:cNvSpPr>
+          <p:nvPr>
+            <p:ph type="sldImg"/>
+          </p:nvPr>
+        </p:nvSpPr>
+        <p:spPr/>
+      </p:sp>
+      <p:sp>
+        <p:nvSpPr>
+          <p:cNvPr id="3" name="Notes Placeholder 2"/>
+          <p:cNvSpPr>
+            <a:spLocks noGrp="1"/>
+          </p:cNvSpPr>
+          <p:nvPr>
+            <p:ph type="body" idx="1"/>
+          </p:nvPr>
+        </p:nvSpPr>
+        <p:spPr/>
+        <p:txBody>
+          <a:bodyPr/>
+          <a:lstStyle/>
+          <a:p>
+            <a:endParaRPr lang="en-US"/>
+          </a:p>
+        </p:txBody>
+      </p:sp>
+      <p:sp>
+        <p:nvSpPr>
+          <p:cNvPr id="4" name="Slide Number Placeholder 3"/>
+          <p:cNvSpPr>
+            <a:spLocks noGrp="1"/>
+          </p:cNvSpPr>
+          <p:nvPr>
+            <p:ph type="sldNum" sz="quarter" idx="10"/>
+          </p:nvPr>
+        </p:nvSpPr>
+        <p:spPr/>
+        <p:txBody>
+          <a:bodyPr/>
+          <a:lstStyle/>
+          <a:p>
+            <a:fld id="{425BF44C-66DE-47A0-9AA7-EFF3B79B935C}" type="slidenum">
+              <a:rPr lang="en-US" smtClean="0"/>
+              <a:t>22</a:t>
+            </a:fld>
+            <a:endParaRPr lang="en-US"/>
+          </a:p>
+        </p:txBody>
+      </p:sp>
+    </p:spTree>
+    <p:extLst>
+      <p:ext uri="{BB962C8B-B14F-4D97-AF65-F5344CB8AC3E}">
+        <p14:creationId xmlns:p14="http://schemas.microsoft.com/office/powerpoint/2010/main" val="958314507"/>
       </p:ext>
     </p:extLst>
   </p:cSld>
@@ -6278,7 +6362,7 @@
           <p:nvPr/>
         </p:nvPicPr>
         <p:blipFill>
-          <a:blip r:embed="rId2"/>
+          <a:blip r:embed="rId3"/>
           <a:stretch>
             <a:fillRect/>
           </a:stretch>
@@ -6308,7 +6392,7 @@
           <p:nvPr/>
         </p:nvPicPr>
         <p:blipFill>
-          <a:blip r:embed="rId3"/>
+          <a:blip r:embed="rId4"/>
           <a:stretch>
             <a:fillRect/>
           </a:stretch>
@@ -6359,6 +6443,40 @@
           </a:fontRef>
         </p:style>
       </p:cxnSp>
+      <p:sp>
+        <p:nvSpPr>
+          <p:cNvPr id="2" name="Rectangle 1">
+            <a:extLst>
+              <a:ext uri="{FF2B5EF4-FFF2-40B4-BE49-F238E27FC236}">
+                <a16:creationId xmlns:a16="http://schemas.microsoft.com/office/drawing/2014/main" id="{72C62080-E4A6-4F07-BEED-DFEE6FC3C9DA}"/>
+              </a:ext>
+            </a:extLst>
+          </p:cNvPr>
+          <p:cNvSpPr/>
+          <p:nvPr/>
+        </p:nvSpPr>
+        <p:spPr>
+          <a:xfrm>
+            <a:off x="0" y="6069429"/>
+            <a:ext cx="6096000" cy="646331"/>
+          </a:xfrm>
+          <a:prstGeom prst="rect">
+            <a:avLst/>
+          </a:prstGeom>
+        </p:spPr>
+        <p:txBody>
+          <a:bodyPr>
+            <a:spAutoFit/>
+          </a:bodyPr>
+          <a:lstStyle/>
+          <a:p>
+            <a:r>
+              <a:rPr lang="en-US" dirty="0"/>
+              <a:t>https://www.infoworld.com/article/2883328/node-js/java-vs-nodejs-an-epic-battle-for-developer-mindshare.html</a:t>
+            </a:r>
+          </a:p>
+        </p:txBody>
+      </p:sp>
     </p:spTree>
     <p:extLst>
       <p:ext uri="{BB962C8B-B14F-4D97-AF65-F5344CB8AC3E}">

</xml_diff>

<commit_message>
add java closure example...
</commit_message>
<xml_diff>
--- a/classes/prog2017/Prog3-Lecture25.pptx
+++ b/classes/prog2017/Prog3-Lecture25.pptx
@@ -5,7 +5,7 @@
     <p:sldMasterId id="2147483648" r:id="rId1"/>
   </p:sldMasterIdLst>
   <p:notesMasterIdLst>
-    <p:notesMasterId r:id="rId24"/>
+    <p:notesMasterId r:id="rId27"/>
   </p:notesMasterIdLst>
   <p:sldIdLst>
     <p:sldId id="256" r:id="rId2"/>
@@ -22,14 +22,17 @@
     <p:sldId id="267" r:id="rId13"/>
     <p:sldId id="268" r:id="rId14"/>
     <p:sldId id="271" r:id="rId15"/>
-    <p:sldId id="269" r:id="rId16"/>
-    <p:sldId id="270" r:id="rId17"/>
-    <p:sldId id="272" r:id="rId18"/>
-    <p:sldId id="273" r:id="rId19"/>
-    <p:sldId id="274" r:id="rId20"/>
-    <p:sldId id="275" r:id="rId21"/>
-    <p:sldId id="276" r:id="rId22"/>
-    <p:sldId id="277" r:id="rId23"/>
+    <p:sldId id="278" r:id="rId16"/>
+    <p:sldId id="269" r:id="rId17"/>
+    <p:sldId id="270" r:id="rId18"/>
+    <p:sldId id="272" r:id="rId19"/>
+    <p:sldId id="273" r:id="rId20"/>
+    <p:sldId id="274" r:id="rId21"/>
+    <p:sldId id="275" r:id="rId22"/>
+    <p:sldId id="276" r:id="rId23"/>
+    <p:sldId id="277" r:id="rId24"/>
+    <p:sldId id="279" r:id="rId25"/>
+    <p:sldId id="280" r:id="rId26"/>
   </p:sldIdLst>
   <p:sldSz cx="12192000" cy="6858000"/>
   <p:notesSz cx="6858000" cy="9144000"/>
@@ -222,7 +225,7 @@
           <a:p>
             <a:fld id="{3BABB8C3-AB64-4198-A259-5325705B1586}" type="datetimeFigureOut">
               <a:rPr lang="en-US" smtClean="0"/>
-              <a:t>11/23/2017</a:t>
+              <a:t>11/25/2017</a:t>
             </a:fld>
             <a:endParaRPr lang="en-US"/>
           </a:p>
@@ -641,7 +644,7 @@
             <a:fld id="{451B84B5-348D-4E6A-A1B8-F07E62553E64}" type="slidenum">
               <a:rPr lang="en-US" smtClean="0"/>
               <a:pPr/>
-              <a:t>20</a:t>
+              <a:t>21</a:t>
             </a:fld>
             <a:endParaRPr lang="en-US"/>
           </a:p>
@@ -725,7 +728,7 @@
           <a:p>
             <a:fld id="{425BF44C-66DE-47A0-9AA7-EFF3B79B935C}" type="slidenum">
               <a:rPr lang="en-US" smtClean="0"/>
-              <a:t>21</a:t>
+              <a:t>22</a:t>
             </a:fld>
             <a:endParaRPr lang="en-US"/>
           </a:p>
@@ -809,7 +812,7 @@
           <a:p>
             <a:fld id="{425BF44C-66DE-47A0-9AA7-EFF3B79B935C}" type="slidenum">
               <a:rPr lang="en-US" smtClean="0"/>
-              <a:t>22</a:t>
+              <a:t>23</a:t>
             </a:fld>
             <a:endParaRPr lang="en-US"/>
           </a:p>
@@ -975,7 +978,7 @@
           <a:p>
             <a:fld id="{32FFEE7D-2242-46A4-9E7F-1E413A012AD3}" type="datetimeFigureOut">
               <a:rPr lang="en-US" smtClean="0"/>
-              <a:t>11/23/2017</a:t>
+              <a:t>11/25/2017</a:t>
             </a:fld>
             <a:endParaRPr lang="en-US"/>
           </a:p>
@@ -1173,7 +1176,7 @@
           <a:p>
             <a:fld id="{32FFEE7D-2242-46A4-9E7F-1E413A012AD3}" type="datetimeFigureOut">
               <a:rPr lang="en-US" smtClean="0"/>
-              <a:t>11/23/2017</a:t>
+              <a:t>11/25/2017</a:t>
             </a:fld>
             <a:endParaRPr lang="en-US"/>
           </a:p>
@@ -1381,7 +1384,7 @@
           <a:p>
             <a:fld id="{32FFEE7D-2242-46A4-9E7F-1E413A012AD3}" type="datetimeFigureOut">
               <a:rPr lang="en-US" smtClean="0"/>
-              <a:t>11/23/2017</a:t>
+              <a:t>11/25/2017</a:t>
             </a:fld>
             <a:endParaRPr lang="en-US"/>
           </a:p>
@@ -1579,7 +1582,7 @@
           <a:p>
             <a:fld id="{32FFEE7D-2242-46A4-9E7F-1E413A012AD3}" type="datetimeFigureOut">
               <a:rPr lang="en-US" smtClean="0"/>
-              <a:t>11/23/2017</a:t>
+              <a:t>11/25/2017</a:t>
             </a:fld>
             <a:endParaRPr lang="en-US"/>
           </a:p>
@@ -1854,7 +1857,7 @@
           <a:p>
             <a:fld id="{32FFEE7D-2242-46A4-9E7F-1E413A012AD3}" type="datetimeFigureOut">
               <a:rPr lang="en-US" smtClean="0"/>
-              <a:t>11/23/2017</a:t>
+              <a:t>11/25/2017</a:t>
             </a:fld>
             <a:endParaRPr lang="en-US"/>
           </a:p>
@@ -2119,7 +2122,7 @@
           <a:p>
             <a:fld id="{32FFEE7D-2242-46A4-9E7F-1E413A012AD3}" type="datetimeFigureOut">
               <a:rPr lang="en-US" smtClean="0"/>
-              <a:t>11/23/2017</a:t>
+              <a:t>11/25/2017</a:t>
             </a:fld>
             <a:endParaRPr lang="en-US"/>
           </a:p>
@@ -2531,7 +2534,7 @@
           <a:p>
             <a:fld id="{32FFEE7D-2242-46A4-9E7F-1E413A012AD3}" type="datetimeFigureOut">
               <a:rPr lang="en-US" smtClean="0"/>
-              <a:t>11/23/2017</a:t>
+              <a:t>11/25/2017</a:t>
             </a:fld>
             <a:endParaRPr lang="en-US"/>
           </a:p>
@@ -2672,7 +2675,7 @@
           <a:p>
             <a:fld id="{32FFEE7D-2242-46A4-9E7F-1E413A012AD3}" type="datetimeFigureOut">
               <a:rPr lang="en-US" smtClean="0"/>
-              <a:t>11/23/2017</a:t>
+              <a:t>11/25/2017</a:t>
             </a:fld>
             <a:endParaRPr lang="en-US"/>
           </a:p>
@@ -2785,7 +2788,7 @@
           <a:p>
             <a:fld id="{32FFEE7D-2242-46A4-9E7F-1E413A012AD3}" type="datetimeFigureOut">
               <a:rPr lang="en-US" smtClean="0"/>
-              <a:t>11/23/2017</a:t>
+              <a:t>11/25/2017</a:t>
             </a:fld>
             <a:endParaRPr lang="en-US"/>
           </a:p>
@@ -3096,7 +3099,7 @@
           <a:p>
             <a:fld id="{32FFEE7D-2242-46A4-9E7F-1E413A012AD3}" type="datetimeFigureOut">
               <a:rPr lang="en-US" smtClean="0"/>
-              <a:t>11/23/2017</a:t>
+              <a:t>11/25/2017</a:t>
             </a:fld>
             <a:endParaRPr lang="en-US"/>
           </a:p>
@@ -3384,7 +3387,7 @@
           <a:p>
             <a:fld id="{32FFEE7D-2242-46A4-9E7F-1E413A012AD3}" type="datetimeFigureOut">
               <a:rPr lang="en-US" smtClean="0"/>
-              <a:t>11/23/2017</a:t>
+              <a:t>11/25/2017</a:t>
             </a:fld>
             <a:endParaRPr lang="en-US"/>
           </a:p>
@@ -3625,7 +3628,7 @@
           <a:p>
             <a:fld id="{32FFEE7D-2242-46A4-9E7F-1E413A012AD3}" type="datetimeFigureOut">
               <a:rPr lang="en-US" smtClean="0"/>
-              <a:t>11/23/2017</a:t>
+              <a:t>11/25/2017</a:t>
             </a:fld>
             <a:endParaRPr lang="en-US"/>
           </a:p>
@@ -4829,6 +4832,231 @@
           <p:cNvPr id="4" name="TextBox 3">
             <a:extLst>
               <a:ext uri="{FF2B5EF4-FFF2-40B4-BE49-F238E27FC236}">
+                <a16:creationId xmlns:a16="http://schemas.microsoft.com/office/drawing/2014/main" id="{A424770F-3B4E-4696-AF27-F5B00113EFCC}"/>
+              </a:ext>
+            </a:extLst>
+          </p:cNvPr>
+          <p:cNvSpPr txBox="1"/>
+          <p:nvPr/>
+        </p:nvSpPr>
+        <p:spPr>
+          <a:xfrm>
+            <a:off x="130628" y="83128"/>
+            <a:ext cx="9189182" cy="369332"/>
+          </a:xfrm>
+          <a:prstGeom prst="rect">
+            <a:avLst/>
+          </a:prstGeom>
+          <a:noFill/>
+        </p:spPr>
+        <p:txBody>
+          <a:bodyPr wrap="none" rtlCol="0">
+            <a:spAutoFit/>
+          </a:bodyPr>
+          <a:lstStyle/>
+          <a:p>
+            <a:r>
+              <a:rPr lang="en-US" dirty="0"/>
+              <a:t>Note that we (sort of) had closures in Java (but the inner functions could only access final data…)</a:t>
+            </a:r>
+          </a:p>
+        </p:txBody>
+      </p:sp>
+      <p:pic>
+        <p:nvPicPr>
+          <p:cNvPr id="5" name="Picture 4">
+            <a:extLst>
+              <a:ext uri="{FF2B5EF4-FFF2-40B4-BE49-F238E27FC236}">
+                <a16:creationId xmlns:a16="http://schemas.microsoft.com/office/drawing/2014/main" id="{C538682A-480A-41F6-9BDA-3A260F4EF6E7}"/>
+              </a:ext>
+            </a:extLst>
+          </p:cNvPr>
+          <p:cNvPicPr>
+            <a:picLocks noChangeAspect="1"/>
+          </p:cNvPicPr>
+          <p:nvPr/>
+        </p:nvPicPr>
+        <p:blipFill>
+          <a:blip r:embed="rId2"/>
+          <a:stretch>
+            <a:fillRect/>
+          </a:stretch>
+        </p:blipFill>
+        <p:spPr>
+          <a:xfrm>
+            <a:off x="920647" y="404563"/>
+            <a:ext cx="4248016" cy="2944277"/>
+          </a:xfrm>
+          <a:prstGeom prst="rect">
+            <a:avLst/>
+          </a:prstGeom>
+        </p:spPr>
+      </p:pic>
+      <p:pic>
+        <p:nvPicPr>
+          <p:cNvPr id="6" name="Picture 5">
+            <a:extLst>
+              <a:ext uri="{FF2B5EF4-FFF2-40B4-BE49-F238E27FC236}">
+                <a16:creationId xmlns:a16="http://schemas.microsoft.com/office/drawing/2014/main" id="{C7F97B6C-842D-4D12-99DC-F51A67C207BF}"/>
+              </a:ext>
+            </a:extLst>
+          </p:cNvPr>
+          <p:cNvPicPr>
+            <a:picLocks noChangeAspect="1"/>
+          </p:cNvPicPr>
+          <p:nvPr/>
+        </p:nvPicPr>
+        <p:blipFill>
+          <a:blip r:embed="rId3"/>
+          <a:stretch>
+            <a:fillRect/>
+          </a:stretch>
+        </p:blipFill>
+        <p:spPr>
+          <a:xfrm>
+            <a:off x="4174425" y="1756834"/>
+            <a:ext cx="5600700" cy="428625"/>
+          </a:xfrm>
+          <a:prstGeom prst="rect">
+            <a:avLst/>
+          </a:prstGeom>
+        </p:spPr>
+      </p:pic>
+      <p:sp>
+        <p:nvSpPr>
+          <p:cNvPr id="7" name="TextBox 6">
+            <a:extLst>
+              <a:ext uri="{FF2B5EF4-FFF2-40B4-BE49-F238E27FC236}">
+                <a16:creationId xmlns:a16="http://schemas.microsoft.com/office/drawing/2014/main" id="{FF50AC70-B613-4E53-B348-45E9C56756D1}"/>
+              </a:ext>
+            </a:extLst>
+          </p:cNvPr>
+          <p:cNvSpPr txBox="1"/>
+          <p:nvPr/>
+        </p:nvSpPr>
+        <p:spPr>
+          <a:xfrm>
+            <a:off x="1757546" y="3145372"/>
+            <a:ext cx="9239004" cy="369332"/>
+          </a:xfrm>
+          <a:prstGeom prst="rect">
+            <a:avLst/>
+          </a:prstGeom>
+          <a:noFill/>
+        </p:spPr>
+        <p:txBody>
+          <a:bodyPr wrap="square" rtlCol="0">
+            <a:spAutoFit/>
+          </a:bodyPr>
+          <a:lstStyle/>
+          <a:p>
+            <a:r>
+              <a:rPr lang="en-US" dirty="0"/>
+              <a:t>Here the inner class has access to x, but Java requires that x be final or “effectively final”  </a:t>
+            </a:r>
+          </a:p>
+        </p:txBody>
+      </p:sp>
+      <p:pic>
+        <p:nvPicPr>
+          <p:cNvPr id="8" name="Picture 7">
+            <a:extLst>
+              <a:ext uri="{FF2B5EF4-FFF2-40B4-BE49-F238E27FC236}">
+                <a16:creationId xmlns:a16="http://schemas.microsoft.com/office/drawing/2014/main" id="{021B6B77-7572-4DBB-85BD-0CFB2989C977}"/>
+              </a:ext>
+            </a:extLst>
+          </p:cNvPr>
+          <p:cNvPicPr>
+            <a:picLocks noChangeAspect="1"/>
+          </p:cNvPicPr>
+          <p:nvPr/>
+        </p:nvPicPr>
+        <p:blipFill>
+          <a:blip r:embed="rId4"/>
+          <a:stretch>
+            <a:fillRect/>
+          </a:stretch>
+        </p:blipFill>
+        <p:spPr>
+          <a:xfrm>
+            <a:off x="1247713" y="3957946"/>
+            <a:ext cx="4257675" cy="2362200"/>
+          </a:xfrm>
+          <a:prstGeom prst="rect">
+            <a:avLst/>
+          </a:prstGeom>
+        </p:spPr>
+      </p:pic>
+      <p:sp>
+        <p:nvSpPr>
+          <p:cNvPr id="9" name="TextBox 8">
+            <a:extLst>
+              <a:ext uri="{FF2B5EF4-FFF2-40B4-BE49-F238E27FC236}">
+                <a16:creationId xmlns:a16="http://schemas.microsoft.com/office/drawing/2014/main" id="{844E7F6C-0190-4550-BD6C-C84AF325A3BB}"/>
+              </a:ext>
+            </a:extLst>
+          </p:cNvPr>
+          <p:cNvSpPr txBox="1"/>
+          <p:nvPr/>
+        </p:nvSpPr>
+        <p:spPr>
+          <a:xfrm>
+            <a:off x="4630217" y="4954380"/>
+            <a:ext cx="2035814" cy="369332"/>
+          </a:xfrm>
+          <a:prstGeom prst="rect">
+            <a:avLst/>
+          </a:prstGeom>
+          <a:noFill/>
+        </p:spPr>
+        <p:txBody>
+          <a:bodyPr wrap="none" rtlCol="0">
+            <a:spAutoFit/>
+          </a:bodyPr>
+          <a:lstStyle/>
+          <a:p>
+            <a:r>
+              <a:rPr lang="en-US" dirty="0"/>
+              <a:t>This compiles fine…</a:t>
+            </a:r>
+          </a:p>
+        </p:txBody>
+      </p:sp>
+    </p:spTree>
+    <p:extLst>
+      <p:ext uri="{BB962C8B-B14F-4D97-AF65-F5344CB8AC3E}">
+        <p14:creationId xmlns:p14="http://schemas.microsoft.com/office/powerpoint/2010/main" val="1805361765"/>
+      </p:ext>
+    </p:extLst>
+  </p:cSld>
+  <p:clrMapOvr>
+    <a:masterClrMapping/>
+  </p:clrMapOvr>
+</p:sld>
+</file>
+
+<file path=ppt/slides/slide16.xml><?xml version="1.0" encoding="utf-8"?>
+<p:sld xmlns:a="http://schemas.openxmlformats.org/drawingml/2006/main" xmlns:r="http://schemas.openxmlformats.org/officeDocument/2006/relationships" xmlns:p="http://schemas.openxmlformats.org/presentationml/2006/main">
+  <p:cSld>
+    <p:spTree>
+      <p:nvGrpSpPr>
+        <p:cNvPr id="1" name=""/>
+        <p:cNvGrpSpPr/>
+        <p:nvPr/>
+      </p:nvGrpSpPr>
+      <p:grpSpPr>
+        <a:xfrm>
+          <a:off x="0" y="0"/>
+          <a:ext cx="0" cy="0"/>
+          <a:chOff x="0" y="0"/>
+          <a:chExt cx="0" cy="0"/>
+        </a:xfrm>
+      </p:grpSpPr>
+      <p:sp>
+        <p:nvSpPr>
+          <p:cNvPr id="4" name="TextBox 3">
+            <a:extLst>
+              <a:ext uri="{FF2B5EF4-FFF2-40B4-BE49-F238E27FC236}">
                 <a16:creationId xmlns:a16="http://schemas.microsoft.com/office/drawing/2014/main" id="{2E7CBA97-ECEB-4826-A78C-4310300E4FE9}"/>
               </a:ext>
             </a:extLst>
@@ -4940,133 +5168,6 @@
 </p:sld>
 </file>
 
-<file path=ppt/slides/slide16.xml><?xml version="1.0" encoding="utf-8"?>
-<p:sld xmlns:a="http://schemas.openxmlformats.org/drawingml/2006/main" xmlns:r="http://schemas.openxmlformats.org/officeDocument/2006/relationships" xmlns:p="http://schemas.openxmlformats.org/presentationml/2006/main">
-  <p:cSld>
-    <p:spTree>
-      <p:nvGrpSpPr>
-        <p:cNvPr id="1" name=""/>
-        <p:cNvGrpSpPr/>
-        <p:nvPr/>
-      </p:nvGrpSpPr>
-      <p:grpSpPr>
-        <a:xfrm>
-          <a:off x="0" y="0"/>
-          <a:ext cx="0" cy="0"/>
-          <a:chOff x="0" y="0"/>
-          <a:chExt cx="0" cy="0"/>
-        </a:xfrm>
-      </p:grpSpPr>
-      <p:sp>
-        <p:nvSpPr>
-          <p:cNvPr id="5" name="TextBox 4">
-            <a:extLst>
-              <a:ext uri="{FF2B5EF4-FFF2-40B4-BE49-F238E27FC236}">
-                <a16:creationId xmlns:a16="http://schemas.microsoft.com/office/drawing/2014/main" id="{50CFFE79-2988-4670-AF26-46758DEE4D06}"/>
-              </a:ext>
-            </a:extLst>
-          </p:cNvPr>
-          <p:cNvSpPr txBox="1"/>
-          <p:nvPr/>
-        </p:nvSpPr>
-        <p:spPr>
-          <a:xfrm>
-            <a:off x="751840" y="228600"/>
-            <a:ext cx="9494907" cy="3139321"/>
-          </a:xfrm>
-          <a:prstGeom prst="rect">
-            <a:avLst/>
-          </a:prstGeom>
-          <a:noFill/>
-        </p:spPr>
-        <p:txBody>
-          <a:bodyPr wrap="none" rtlCol="0">
-            <a:spAutoFit/>
-          </a:bodyPr>
-          <a:lstStyle/>
-          <a:p>
-            <a:r>
-              <a:rPr lang="en-US" dirty="0" err="1"/>
-              <a:t>Javascript</a:t>
-            </a:r>
-            <a:r>
-              <a:rPr lang="en-US" dirty="0"/>
-              <a:t> does not allow multiple threads to share access to mutable data.</a:t>
-            </a:r>
-          </a:p>
-          <a:p>
-            <a:endParaRPr lang="en-US" dirty="0"/>
-          </a:p>
-          <a:p>
-            <a:r>
-              <a:rPr lang="en-US" dirty="0"/>
-              <a:t>There is no equivalent to new Thread().start().</a:t>
-            </a:r>
-          </a:p>
-          <a:p>
-            <a:endParaRPr lang="en-US" dirty="0"/>
-          </a:p>
-          <a:p>
-            <a:r>
-              <a:rPr lang="en-US" dirty="0"/>
-              <a:t>There are no Semaphores or other methods for </a:t>
-            </a:r>
-            <a:r>
-              <a:rPr lang="en-US" dirty="0" err="1"/>
-              <a:t>co-ordinating</a:t>
-            </a:r>
-            <a:r>
-              <a:rPr lang="en-US" dirty="0"/>
-              <a:t> multiple threads.</a:t>
-            </a:r>
-          </a:p>
-          <a:p>
-            <a:endParaRPr lang="en-US" dirty="0"/>
-          </a:p>
-          <a:p>
-            <a:r>
-              <a:rPr lang="en-US" dirty="0"/>
-              <a:t>“Everything is multi-threaded except your code”</a:t>
-            </a:r>
-          </a:p>
-          <a:p>
-            <a:endParaRPr lang="en-US" dirty="0"/>
-          </a:p>
-          <a:p>
-            <a:r>
-              <a:rPr lang="en-US" dirty="0"/>
-              <a:t>However, </a:t>
-            </a:r>
-            <a:r>
-              <a:rPr lang="en-US" dirty="0" err="1"/>
-              <a:t>javascript</a:t>
-            </a:r>
-            <a:r>
-              <a:rPr lang="en-US" dirty="0"/>
-              <a:t> can still manage multiple events via the use of closures and callback functions…</a:t>
-            </a:r>
-          </a:p>
-          <a:p>
-            <a:endParaRPr lang="en-US" dirty="0"/>
-          </a:p>
-          <a:p>
-            <a:endParaRPr lang="en-US" dirty="0"/>
-          </a:p>
-        </p:txBody>
-      </p:sp>
-    </p:spTree>
-    <p:extLst>
-      <p:ext uri="{BB962C8B-B14F-4D97-AF65-F5344CB8AC3E}">
-        <p14:creationId xmlns:p14="http://schemas.microsoft.com/office/powerpoint/2010/main" val="3854446632"/>
-      </p:ext>
-    </p:extLst>
-  </p:cSld>
-  <p:clrMapOvr>
-    <a:masterClrMapping/>
-  </p:clrMapOvr>
-</p:sld>
-</file>
-
 <file path=ppt/slides/slide17.xml><?xml version="1.0" encoding="utf-8"?>
 <p:sld xmlns:a="http://schemas.openxmlformats.org/drawingml/2006/main" xmlns:r="http://schemas.openxmlformats.org/officeDocument/2006/relationships" xmlns:p="http://schemas.openxmlformats.org/presentationml/2006/main">
   <p:cSld>
@@ -5086,10 +5187,10 @@
       </p:grpSpPr>
       <p:sp>
         <p:nvSpPr>
-          <p:cNvPr id="4" name="TextBox 3">
-            <a:extLst>
-              <a:ext uri="{FF2B5EF4-FFF2-40B4-BE49-F238E27FC236}">
-                <a16:creationId xmlns:a16="http://schemas.microsoft.com/office/drawing/2014/main" id="{66CEA5B0-2611-4557-B562-17B641B9EB0E}"/>
+          <p:cNvPr id="5" name="TextBox 4">
+            <a:extLst>
+              <a:ext uri="{FF2B5EF4-FFF2-40B4-BE49-F238E27FC236}">
+                <a16:creationId xmlns:a16="http://schemas.microsoft.com/office/drawing/2014/main" id="{50CFFE79-2988-4670-AF26-46758DEE4D06}"/>
               </a:ext>
             </a:extLst>
           </p:cNvPr>
@@ -5098,8 +5199,8 @@
         </p:nvSpPr>
         <p:spPr>
           <a:xfrm>
-            <a:off x="314960" y="-5080"/>
-            <a:ext cx="8413778" cy="369332"/>
+            <a:off x="751840" y="228600"/>
+            <a:ext cx="9494907" cy="3139321"/>
           </a:xfrm>
           <a:prstGeom prst="rect">
             <a:avLst/>
@@ -5113,126 +5214,78 @@
           <a:lstStyle/>
           <a:p>
             <a:r>
-              <a:rPr lang="en-US" dirty="0"/>
-              <a:t>Here is a skeleton server that allows each client to have an associated state (via closures)</a:t>
-            </a:r>
-          </a:p>
-        </p:txBody>
-      </p:sp>
-      <p:pic>
-        <p:nvPicPr>
-          <p:cNvPr id="5" name="Picture 4">
-            <a:extLst>
-              <a:ext uri="{FF2B5EF4-FFF2-40B4-BE49-F238E27FC236}">
-                <a16:creationId xmlns:a16="http://schemas.microsoft.com/office/drawing/2014/main" id="{F7C20191-E514-4A7F-A3D7-E51090F2CC1A}"/>
-              </a:ext>
-            </a:extLst>
-          </p:cNvPr>
-          <p:cNvPicPr>
-            <a:picLocks noChangeAspect="1"/>
-          </p:cNvPicPr>
-          <p:nvPr/>
-        </p:nvPicPr>
-        <p:blipFill>
-          <a:blip r:embed="rId2"/>
-          <a:stretch>
-            <a:fillRect/>
-          </a:stretch>
-        </p:blipFill>
-        <p:spPr>
-          <a:xfrm>
-            <a:off x="326451" y="365760"/>
-            <a:ext cx="8893749" cy="5295122"/>
-          </a:xfrm>
-          <a:prstGeom prst="rect">
-            <a:avLst/>
-          </a:prstGeom>
-        </p:spPr>
-      </p:pic>
-      <p:cxnSp>
-        <p:nvCxnSpPr>
-          <p:cNvPr id="7" name="Straight Arrow Connector 6">
-            <a:extLst>
-              <a:ext uri="{FF2B5EF4-FFF2-40B4-BE49-F238E27FC236}">
-                <a16:creationId xmlns:a16="http://schemas.microsoft.com/office/drawing/2014/main" id="{70C7DFAA-AB75-4FCF-B82B-0401F8FCA6D2}"/>
-              </a:ext>
-            </a:extLst>
-          </p:cNvPr>
-          <p:cNvCxnSpPr/>
-          <p:nvPr/>
-        </p:nvCxnSpPr>
-        <p:spPr>
-          <a:xfrm flipH="1">
-            <a:off x="8728738" y="3886200"/>
-            <a:ext cx="1324582" cy="0"/>
-          </a:xfrm>
-          <a:prstGeom prst="straightConnector1">
-            <a:avLst/>
-          </a:prstGeom>
-          <a:ln>
-            <a:tailEnd type="triangle"/>
-          </a:ln>
-        </p:spPr>
-        <p:style>
-          <a:lnRef idx="1">
-            <a:schemeClr val="accent1"/>
-          </a:lnRef>
-          <a:fillRef idx="0">
-            <a:schemeClr val="accent1"/>
-          </a:fillRef>
-          <a:effectRef idx="0">
-            <a:schemeClr val="accent1"/>
-          </a:effectRef>
-          <a:fontRef idx="minor">
-            <a:schemeClr val="tx1"/>
-          </a:fontRef>
-        </p:style>
-      </p:cxnSp>
-      <p:sp>
-        <p:nvSpPr>
-          <p:cNvPr id="8" name="TextBox 7">
-            <a:extLst>
-              <a:ext uri="{FF2B5EF4-FFF2-40B4-BE49-F238E27FC236}">
-                <a16:creationId xmlns:a16="http://schemas.microsoft.com/office/drawing/2014/main" id="{C31E3FF9-2342-4B8F-973A-A539A79AD9DB}"/>
-              </a:ext>
-            </a:extLst>
-          </p:cNvPr>
-          <p:cNvSpPr txBox="1"/>
-          <p:nvPr/>
-        </p:nvSpPr>
-        <p:spPr>
-          <a:xfrm>
-            <a:off x="10038080" y="3703320"/>
-            <a:ext cx="2159566" cy="646331"/>
-          </a:xfrm>
-          <a:prstGeom prst="rect">
-            <a:avLst/>
-          </a:prstGeom>
-          <a:noFill/>
-        </p:spPr>
-        <p:txBody>
-          <a:bodyPr wrap="none" rtlCol="0">
-            <a:spAutoFit/>
-          </a:bodyPr>
-          <a:lstStyle/>
-          <a:p>
-            <a:r>
-              <a:rPr lang="en-US" dirty="0"/>
-              <a:t>Capture local </a:t>
-            </a:r>
-          </a:p>
-          <a:p>
-            <a:r>
-              <a:rPr lang="en-US" dirty="0"/>
-              <a:t>variables via closures</a:t>
-            </a:r>
+              <a:rPr lang="en-US" dirty="0" err="1"/>
+              <a:t>Javascript</a:t>
+            </a:r>
+            <a:r>
+              <a:rPr lang="en-US" dirty="0"/>
+              <a:t> does not allow multiple threads to share access to mutable data.</a:t>
+            </a:r>
+          </a:p>
+          <a:p>
+            <a:endParaRPr lang="en-US" dirty="0"/>
+          </a:p>
+          <a:p>
+            <a:r>
+              <a:rPr lang="en-US" dirty="0"/>
+              <a:t>There is no equivalent to new Thread().start().</a:t>
+            </a:r>
+          </a:p>
+          <a:p>
+            <a:endParaRPr lang="en-US" dirty="0"/>
+          </a:p>
+          <a:p>
+            <a:r>
+              <a:rPr lang="en-US" dirty="0"/>
+              <a:t>There are no Semaphores or other methods for </a:t>
+            </a:r>
+            <a:r>
+              <a:rPr lang="en-US" dirty="0" err="1"/>
+              <a:t>co-ordinating</a:t>
+            </a:r>
+            <a:r>
+              <a:rPr lang="en-US" dirty="0"/>
+              <a:t> multiple threads.</a:t>
+            </a:r>
+          </a:p>
+          <a:p>
+            <a:endParaRPr lang="en-US" dirty="0"/>
+          </a:p>
+          <a:p>
+            <a:r>
+              <a:rPr lang="en-US" dirty="0"/>
+              <a:t>“Everything is multi-threaded except your code”</a:t>
+            </a:r>
+          </a:p>
+          <a:p>
+            <a:endParaRPr lang="en-US" dirty="0"/>
+          </a:p>
+          <a:p>
+            <a:r>
+              <a:rPr lang="en-US" dirty="0"/>
+              <a:t>However, </a:t>
+            </a:r>
+            <a:r>
+              <a:rPr lang="en-US" dirty="0" err="1"/>
+              <a:t>javascript</a:t>
+            </a:r>
+            <a:r>
+              <a:rPr lang="en-US" dirty="0"/>
+              <a:t> can still manage multiple events via the use of closures and callback functions…</a:t>
+            </a:r>
+          </a:p>
+          <a:p>
+            <a:endParaRPr lang="en-US" dirty="0"/>
+          </a:p>
+          <a:p>
+            <a:endParaRPr lang="en-US" dirty="0"/>
           </a:p>
         </p:txBody>
       </p:sp>
     </p:spTree>
     <p:extLst>
       <p:ext uri="{BB962C8B-B14F-4D97-AF65-F5344CB8AC3E}">
-        <p14:creationId xmlns:p14="http://schemas.microsoft.com/office/powerpoint/2010/main" val="2766451810"/>
+        <p14:creationId xmlns:p14="http://schemas.microsoft.com/office/powerpoint/2010/main" val="3854446632"/>
       </p:ext>
     </p:extLst>
   </p:cSld>
@@ -5259,12 +5312,47 @@
           <a:chExt cx="0" cy="0"/>
         </a:xfrm>
       </p:grpSpPr>
+      <p:sp>
+        <p:nvSpPr>
+          <p:cNvPr id="4" name="TextBox 3">
+            <a:extLst>
+              <a:ext uri="{FF2B5EF4-FFF2-40B4-BE49-F238E27FC236}">
+                <a16:creationId xmlns:a16="http://schemas.microsoft.com/office/drawing/2014/main" id="{66CEA5B0-2611-4557-B562-17B641B9EB0E}"/>
+              </a:ext>
+            </a:extLst>
+          </p:cNvPr>
+          <p:cNvSpPr txBox="1"/>
+          <p:nvPr/>
+        </p:nvSpPr>
+        <p:spPr>
+          <a:xfrm>
+            <a:off x="314960" y="-5080"/>
+            <a:ext cx="8413778" cy="369332"/>
+          </a:xfrm>
+          <a:prstGeom prst="rect">
+            <a:avLst/>
+          </a:prstGeom>
+          <a:noFill/>
+        </p:spPr>
+        <p:txBody>
+          <a:bodyPr wrap="none" rtlCol="0">
+            <a:spAutoFit/>
+          </a:bodyPr>
+          <a:lstStyle/>
+          <a:p>
+            <a:r>
+              <a:rPr lang="en-US" dirty="0"/>
+              <a:t>Here is a skeleton server that allows each client to have an associated state (via closures)</a:t>
+            </a:r>
+          </a:p>
+        </p:txBody>
+      </p:sp>
       <p:pic>
         <p:nvPicPr>
-          <p:cNvPr id="4" name="Picture 3">
-            <a:extLst>
-              <a:ext uri="{FF2B5EF4-FFF2-40B4-BE49-F238E27FC236}">
-                <a16:creationId xmlns:a16="http://schemas.microsoft.com/office/drawing/2014/main" id="{984FAD5E-A59F-4759-8470-8B4959BCA7F2}"/>
+          <p:cNvPr id="5" name="Picture 4">
+            <a:extLst>
+              <a:ext uri="{FF2B5EF4-FFF2-40B4-BE49-F238E27FC236}">
+                <a16:creationId xmlns:a16="http://schemas.microsoft.com/office/drawing/2014/main" id="{F7C20191-E514-4A7F-A3D7-E51090F2CC1A}"/>
               </a:ext>
             </a:extLst>
           </p:cNvPr>
@@ -5281,38 +5369,8 @@
         </p:blipFill>
         <p:spPr>
           <a:xfrm>
-            <a:off x="6531610" y="187960"/>
-            <a:ext cx="4999990" cy="1989525"/>
-          </a:xfrm>
-          <a:prstGeom prst="rect">
-            <a:avLst/>
-          </a:prstGeom>
-        </p:spPr>
-      </p:pic>
-      <p:pic>
-        <p:nvPicPr>
-          <p:cNvPr id="5" name="Picture 4">
-            <a:extLst>
-              <a:ext uri="{FF2B5EF4-FFF2-40B4-BE49-F238E27FC236}">
-                <a16:creationId xmlns:a16="http://schemas.microsoft.com/office/drawing/2014/main" id="{980280E9-6340-4639-8E8E-EFD3D977C0DC}"/>
-              </a:ext>
-            </a:extLst>
-          </p:cNvPr>
-          <p:cNvPicPr>
-            <a:picLocks noChangeAspect="1"/>
-          </p:cNvPicPr>
-          <p:nvPr/>
-        </p:nvPicPr>
-        <p:blipFill>
-          <a:blip r:embed="rId2"/>
-          <a:stretch>
-            <a:fillRect/>
-          </a:stretch>
-        </p:blipFill>
-        <p:spPr>
-          <a:xfrm>
-            <a:off x="6196329" y="4460240"/>
-            <a:ext cx="4999987" cy="1989524"/>
+            <a:off x="326451" y="365760"/>
+            <a:ext cx="8893749" cy="5295122"/>
           </a:xfrm>
           <a:prstGeom prst="rect">
             <a:avLst/>
@@ -5324,19 +5382,17 @@
           <p:cNvPr id="7" name="Straight Arrow Connector 6">
             <a:extLst>
               <a:ext uri="{FF2B5EF4-FFF2-40B4-BE49-F238E27FC236}">
-                <a16:creationId xmlns:a16="http://schemas.microsoft.com/office/drawing/2014/main" id="{7A993F22-D805-4ED7-8C98-0F553AE6E5BB}"/>
-              </a:ext>
-            </a:extLst>
-          </p:cNvPr>
-          <p:cNvCxnSpPr>
-            <a:cxnSpLocks/>
-          </p:cNvCxnSpPr>
+                <a16:creationId xmlns:a16="http://schemas.microsoft.com/office/drawing/2014/main" id="{70C7DFAA-AB75-4FCF-B82B-0401F8FCA6D2}"/>
+              </a:ext>
+            </a:extLst>
+          </p:cNvPr>
+          <p:cNvCxnSpPr/>
           <p:nvPr/>
         </p:nvCxnSpPr>
         <p:spPr>
           <a:xfrm flipH="1">
-            <a:off x="4221480" y="817880"/>
-            <a:ext cx="2350769" cy="1359605"/>
+            <a:off x="8728738" y="3886200"/>
+            <a:ext cx="1324582" cy="0"/>
           </a:xfrm>
           <a:prstGeom prst="straightConnector1">
             <a:avLst/>
@@ -5360,152 +5416,12 @@
           </a:fontRef>
         </p:style>
       </p:cxnSp>
-      <p:cxnSp>
-        <p:nvCxnSpPr>
-          <p:cNvPr id="9" name="Straight Arrow Connector 8">
-            <a:extLst>
-              <a:ext uri="{FF2B5EF4-FFF2-40B4-BE49-F238E27FC236}">
-                <a16:creationId xmlns:a16="http://schemas.microsoft.com/office/drawing/2014/main" id="{5FC71DBE-A7DD-45BC-83AF-EE175BDAEEE2}"/>
-              </a:ext>
-            </a:extLst>
-          </p:cNvPr>
-          <p:cNvCxnSpPr>
-            <a:cxnSpLocks/>
-          </p:cNvCxnSpPr>
-          <p:nvPr/>
-        </p:nvCxnSpPr>
-        <p:spPr>
-          <a:xfrm flipH="1" flipV="1">
-            <a:off x="3840480" y="3906520"/>
-            <a:ext cx="2255520" cy="1493521"/>
-          </a:xfrm>
-          <a:prstGeom prst="straightConnector1">
-            <a:avLst/>
-          </a:prstGeom>
-          <a:ln>
-            <a:tailEnd type="triangle"/>
-          </a:ln>
-        </p:spPr>
-        <p:style>
-          <a:lnRef idx="1">
-            <a:schemeClr val="accent1"/>
-          </a:lnRef>
-          <a:fillRef idx="0">
-            <a:schemeClr val="accent1"/>
-          </a:fillRef>
-          <a:effectRef idx="0">
-            <a:schemeClr val="accent1"/>
-          </a:effectRef>
-          <a:fontRef idx="minor">
-            <a:schemeClr val="tx1"/>
-          </a:fontRef>
-        </p:style>
-      </p:cxnSp>
-      <p:pic>
-        <p:nvPicPr>
-          <p:cNvPr id="10" name="Picture 9">
-            <a:extLst>
-              <a:ext uri="{FF2B5EF4-FFF2-40B4-BE49-F238E27FC236}">
-                <a16:creationId xmlns:a16="http://schemas.microsoft.com/office/drawing/2014/main" id="{83E24ECA-FBEC-4CCA-8963-28730CCAFA89}"/>
-              </a:ext>
-            </a:extLst>
-          </p:cNvPr>
-          <p:cNvPicPr>
-            <a:picLocks noChangeAspect="1"/>
-          </p:cNvPicPr>
-          <p:nvPr/>
-        </p:nvPicPr>
-        <p:blipFill>
-          <a:blip r:embed="rId3"/>
-          <a:stretch>
-            <a:fillRect/>
-          </a:stretch>
-        </p:blipFill>
-        <p:spPr>
-          <a:xfrm>
-            <a:off x="119380" y="2209994"/>
-            <a:ext cx="3924301" cy="1557338"/>
-          </a:xfrm>
-          <a:prstGeom prst="rect">
-            <a:avLst/>
-          </a:prstGeom>
-        </p:spPr>
-      </p:pic>
-      <p:pic>
-        <p:nvPicPr>
-          <p:cNvPr id="13" name="Picture 12">
-            <a:extLst>
-              <a:ext uri="{FF2B5EF4-FFF2-40B4-BE49-F238E27FC236}">
-                <a16:creationId xmlns:a16="http://schemas.microsoft.com/office/drawing/2014/main" id="{550B4E21-AEDB-4C72-BA6A-4408F3C73697}"/>
-              </a:ext>
-            </a:extLst>
-          </p:cNvPr>
-          <p:cNvPicPr>
-            <a:picLocks noChangeAspect="1"/>
-          </p:cNvPicPr>
-          <p:nvPr/>
-        </p:nvPicPr>
-        <p:blipFill>
-          <a:blip r:embed="rId2"/>
-          <a:stretch>
-            <a:fillRect/>
-          </a:stretch>
-        </p:blipFill>
-        <p:spPr>
-          <a:xfrm>
-            <a:off x="6404609" y="2324100"/>
-            <a:ext cx="4999987" cy="1989524"/>
-          </a:xfrm>
-          <a:prstGeom prst="rect">
-            <a:avLst/>
-          </a:prstGeom>
-        </p:spPr>
-      </p:pic>
-      <p:cxnSp>
-        <p:nvCxnSpPr>
-          <p:cNvPr id="15" name="Straight Arrow Connector 14">
-            <a:extLst>
-              <a:ext uri="{FF2B5EF4-FFF2-40B4-BE49-F238E27FC236}">
-                <a16:creationId xmlns:a16="http://schemas.microsoft.com/office/drawing/2014/main" id="{0F30ED01-C899-4BB1-B65C-3FCFB7E16C6F}"/>
-              </a:ext>
-            </a:extLst>
-          </p:cNvPr>
-          <p:cNvCxnSpPr/>
-          <p:nvPr/>
-        </p:nvCxnSpPr>
-        <p:spPr>
-          <a:xfrm flipH="1" flipV="1">
-            <a:off x="4257040" y="3114040"/>
-            <a:ext cx="2016760" cy="40640"/>
-          </a:xfrm>
-          <a:prstGeom prst="straightConnector1">
-            <a:avLst/>
-          </a:prstGeom>
-          <a:ln>
-            <a:tailEnd type="triangle"/>
-          </a:ln>
-        </p:spPr>
-        <p:style>
-          <a:lnRef idx="1">
-            <a:schemeClr val="accent1"/>
-          </a:lnRef>
-          <a:fillRef idx="0">
-            <a:schemeClr val="accent1"/>
-          </a:fillRef>
-          <a:effectRef idx="0">
-            <a:schemeClr val="accent1"/>
-          </a:effectRef>
-          <a:fontRef idx="minor">
-            <a:schemeClr val="tx1"/>
-          </a:fontRef>
-        </p:style>
-      </p:cxnSp>
-      <p:sp>
-        <p:nvSpPr>
-          <p:cNvPr id="16" name="TextBox 15">
-            <a:extLst>
-              <a:ext uri="{FF2B5EF4-FFF2-40B4-BE49-F238E27FC236}">
-                <a16:creationId xmlns:a16="http://schemas.microsoft.com/office/drawing/2014/main" id="{887437D5-66CD-44E4-B951-F5A8A9D7C6A3}"/>
+      <p:sp>
+        <p:nvSpPr>
+          <p:cNvPr id="8" name="TextBox 7">
+            <a:extLst>
+              <a:ext uri="{FF2B5EF4-FFF2-40B4-BE49-F238E27FC236}">
+                <a16:creationId xmlns:a16="http://schemas.microsoft.com/office/drawing/2014/main" id="{C31E3FF9-2342-4B8F-973A-A539A79AD9DB}"/>
               </a:ext>
             </a:extLst>
           </p:cNvPr>
@@ -5514,8 +5430,8 @@
         </p:nvSpPr>
         <p:spPr>
           <a:xfrm>
-            <a:off x="441960" y="421640"/>
-            <a:ext cx="5000087" cy="369332"/>
+            <a:off x="10038080" y="3703320"/>
+            <a:ext cx="2159566" cy="646331"/>
           </a:xfrm>
           <a:prstGeom prst="rect">
             <a:avLst/>
@@ -5530,7 +5446,13 @@
           <a:p>
             <a:r>
               <a:rPr lang="en-US" dirty="0"/>
-              <a:t>Via the closure, each client can have its own state…</a:t>
+              <a:t>Capture local </a:t>
+            </a:r>
+          </a:p>
+          <a:p>
+            <a:r>
+              <a:rPr lang="en-US" dirty="0"/>
+              <a:t>variables via closures</a:t>
             </a:r>
           </a:p>
         </p:txBody>
@@ -5538,7 +5460,7 @@
     </p:spTree>
     <p:extLst>
       <p:ext uri="{BB962C8B-B14F-4D97-AF65-F5344CB8AC3E}">
-        <p14:creationId xmlns:p14="http://schemas.microsoft.com/office/powerpoint/2010/main" val="550491013"/>
+        <p14:creationId xmlns:p14="http://schemas.microsoft.com/office/powerpoint/2010/main" val="2766451810"/>
       </p:ext>
     </p:extLst>
   </p:cSld>
@@ -5570,7 +5492,7 @@
           <p:cNvPr id="4" name="Picture 3">
             <a:extLst>
               <a:ext uri="{FF2B5EF4-FFF2-40B4-BE49-F238E27FC236}">
-                <a16:creationId xmlns:a16="http://schemas.microsoft.com/office/drawing/2014/main" id="{B1C3CA1B-30D8-4E4B-B2DD-B48214B3A971}"/>
+                <a16:creationId xmlns:a16="http://schemas.microsoft.com/office/drawing/2014/main" id="{984FAD5E-A59F-4759-8470-8B4959BCA7F2}"/>
               </a:ext>
             </a:extLst>
           </p:cNvPr>
@@ -5587,20 +5509,231 @@
         </p:blipFill>
         <p:spPr>
           <a:xfrm>
-            <a:off x="2676751" y="1518920"/>
-            <a:ext cx="6634526" cy="4541520"/>
+            <a:off x="6531610" y="187960"/>
+            <a:ext cx="4999990" cy="1989525"/>
           </a:xfrm>
           <a:prstGeom prst="rect">
             <a:avLst/>
           </a:prstGeom>
         </p:spPr>
       </p:pic>
-      <p:sp>
-        <p:nvSpPr>
-          <p:cNvPr id="5" name="TextBox 4">
-            <a:extLst>
-              <a:ext uri="{FF2B5EF4-FFF2-40B4-BE49-F238E27FC236}">
-                <a16:creationId xmlns:a16="http://schemas.microsoft.com/office/drawing/2014/main" id="{64316802-128B-4783-952A-4240FF36E138}"/>
+      <p:pic>
+        <p:nvPicPr>
+          <p:cNvPr id="5" name="Picture 4">
+            <a:extLst>
+              <a:ext uri="{FF2B5EF4-FFF2-40B4-BE49-F238E27FC236}">
+                <a16:creationId xmlns:a16="http://schemas.microsoft.com/office/drawing/2014/main" id="{980280E9-6340-4639-8E8E-EFD3D977C0DC}"/>
+              </a:ext>
+            </a:extLst>
+          </p:cNvPr>
+          <p:cNvPicPr>
+            <a:picLocks noChangeAspect="1"/>
+          </p:cNvPicPr>
+          <p:nvPr/>
+        </p:nvPicPr>
+        <p:blipFill>
+          <a:blip r:embed="rId2"/>
+          <a:stretch>
+            <a:fillRect/>
+          </a:stretch>
+        </p:blipFill>
+        <p:spPr>
+          <a:xfrm>
+            <a:off x="6196329" y="4460240"/>
+            <a:ext cx="4999987" cy="1989524"/>
+          </a:xfrm>
+          <a:prstGeom prst="rect">
+            <a:avLst/>
+          </a:prstGeom>
+        </p:spPr>
+      </p:pic>
+      <p:cxnSp>
+        <p:nvCxnSpPr>
+          <p:cNvPr id="7" name="Straight Arrow Connector 6">
+            <a:extLst>
+              <a:ext uri="{FF2B5EF4-FFF2-40B4-BE49-F238E27FC236}">
+                <a16:creationId xmlns:a16="http://schemas.microsoft.com/office/drawing/2014/main" id="{7A993F22-D805-4ED7-8C98-0F553AE6E5BB}"/>
+              </a:ext>
+            </a:extLst>
+          </p:cNvPr>
+          <p:cNvCxnSpPr>
+            <a:cxnSpLocks/>
+          </p:cNvCxnSpPr>
+          <p:nvPr/>
+        </p:nvCxnSpPr>
+        <p:spPr>
+          <a:xfrm flipH="1">
+            <a:off x="4221480" y="817880"/>
+            <a:ext cx="2350769" cy="1359605"/>
+          </a:xfrm>
+          <a:prstGeom prst="straightConnector1">
+            <a:avLst/>
+          </a:prstGeom>
+          <a:ln>
+            <a:tailEnd type="triangle"/>
+          </a:ln>
+        </p:spPr>
+        <p:style>
+          <a:lnRef idx="1">
+            <a:schemeClr val="accent1"/>
+          </a:lnRef>
+          <a:fillRef idx="0">
+            <a:schemeClr val="accent1"/>
+          </a:fillRef>
+          <a:effectRef idx="0">
+            <a:schemeClr val="accent1"/>
+          </a:effectRef>
+          <a:fontRef idx="minor">
+            <a:schemeClr val="tx1"/>
+          </a:fontRef>
+        </p:style>
+      </p:cxnSp>
+      <p:cxnSp>
+        <p:nvCxnSpPr>
+          <p:cNvPr id="9" name="Straight Arrow Connector 8">
+            <a:extLst>
+              <a:ext uri="{FF2B5EF4-FFF2-40B4-BE49-F238E27FC236}">
+                <a16:creationId xmlns:a16="http://schemas.microsoft.com/office/drawing/2014/main" id="{5FC71DBE-A7DD-45BC-83AF-EE175BDAEEE2}"/>
+              </a:ext>
+            </a:extLst>
+          </p:cNvPr>
+          <p:cNvCxnSpPr>
+            <a:cxnSpLocks/>
+          </p:cNvCxnSpPr>
+          <p:nvPr/>
+        </p:nvCxnSpPr>
+        <p:spPr>
+          <a:xfrm flipH="1" flipV="1">
+            <a:off x="3840480" y="3906520"/>
+            <a:ext cx="2255520" cy="1493521"/>
+          </a:xfrm>
+          <a:prstGeom prst="straightConnector1">
+            <a:avLst/>
+          </a:prstGeom>
+          <a:ln>
+            <a:tailEnd type="triangle"/>
+          </a:ln>
+        </p:spPr>
+        <p:style>
+          <a:lnRef idx="1">
+            <a:schemeClr val="accent1"/>
+          </a:lnRef>
+          <a:fillRef idx="0">
+            <a:schemeClr val="accent1"/>
+          </a:fillRef>
+          <a:effectRef idx="0">
+            <a:schemeClr val="accent1"/>
+          </a:effectRef>
+          <a:fontRef idx="minor">
+            <a:schemeClr val="tx1"/>
+          </a:fontRef>
+        </p:style>
+      </p:cxnSp>
+      <p:pic>
+        <p:nvPicPr>
+          <p:cNvPr id="10" name="Picture 9">
+            <a:extLst>
+              <a:ext uri="{FF2B5EF4-FFF2-40B4-BE49-F238E27FC236}">
+                <a16:creationId xmlns:a16="http://schemas.microsoft.com/office/drawing/2014/main" id="{83E24ECA-FBEC-4CCA-8963-28730CCAFA89}"/>
+              </a:ext>
+            </a:extLst>
+          </p:cNvPr>
+          <p:cNvPicPr>
+            <a:picLocks noChangeAspect="1"/>
+          </p:cNvPicPr>
+          <p:nvPr/>
+        </p:nvPicPr>
+        <p:blipFill>
+          <a:blip r:embed="rId3"/>
+          <a:stretch>
+            <a:fillRect/>
+          </a:stretch>
+        </p:blipFill>
+        <p:spPr>
+          <a:xfrm>
+            <a:off x="119380" y="2209994"/>
+            <a:ext cx="3924301" cy="1557338"/>
+          </a:xfrm>
+          <a:prstGeom prst="rect">
+            <a:avLst/>
+          </a:prstGeom>
+        </p:spPr>
+      </p:pic>
+      <p:pic>
+        <p:nvPicPr>
+          <p:cNvPr id="13" name="Picture 12">
+            <a:extLst>
+              <a:ext uri="{FF2B5EF4-FFF2-40B4-BE49-F238E27FC236}">
+                <a16:creationId xmlns:a16="http://schemas.microsoft.com/office/drawing/2014/main" id="{550B4E21-AEDB-4C72-BA6A-4408F3C73697}"/>
+              </a:ext>
+            </a:extLst>
+          </p:cNvPr>
+          <p:cNvPicPr>
+            <a:picLocks noChangeAspect="1"/>
+          </p:cNvPicPr>
+          <p:nvPr/>
+        </p:nvPicPr>
+        <p:blipFill>
+          <a:blip r:embed="rId2"/>
+          <a:stretch>
+            <a:fillRect/>
+          </a:stretch>
+        </p:blipFill>
+        <p:spPr>
+          <a:xfrm>
+            <a:off x="6404609" y="2324100"/>
+            <a:ext cx="4999987" cy="1989524"/>
+          </a:xfrm>
+          <a:prstGeom prst="rect">
+            <a:avLst/>
+          </a:prstGeom>
+        </p:spPr>
+      </p:pic>
+      <p:cxnSp>
+        <p:nvCxnSpPr>
+          <p:cNvPr id="15" name="Straight Arrow Connector 14">
+            <a:extLst>
+              <a:ext uri="{FF2B5EF4-FFF2-40B4-BE49-F238E27FC236}">
+                <a16:creationId xmlns:a16="http://schemas.microsoft.com/office/drawing/2014/main" id="{0F30ED01-C899-4BB1-B65C-3FCFB7E16C6F}"/>
+              </a:ext>
+            </a:extLst>
+          </p:cNvPr>
+          <p:cNvCxnSpPr/>
+          <p:nvPr/>
+        </p:nvCxnSpPr>
+        <p:spPr>
+          <a:xfrm flipH="1" flipV="1">
+            <a:off x="4257040" y="3114040"/>
+            <a:ext cx="2016760" cy="40640"/>
+          </a:xfrm>
+          <a:prstGeom prst="straightConnector1">
+            <a:avLst/>
+          </a:prstGeom>
+          <a:ln>
+            <a:tailEnd type="triangle"/>
+          </a:ln>
+        </p:spPr>
+        <p:style>
+          <a:lnRef idx="1">
+            <a:schemeClr val="accent1"/>
+          </a:lnRef>
+          <a:fillRef idx="0">
+            <a:schemeClr val="accent1"/>
+          </a:fillRef>
+          <a:effectRef idx="0">
+            <a:schemeClr val="accent1"/>
+          </a:effectRef>
+          <a:fontRef idx="minor">
+            <a:schemeClr val="tx1"/>
+          </a:fontRef>
+        </p:style>
+      </p:cxnSp>
+      <p:sp>
+        <p:nvSpPr>
+          <p:cNvPr id="16" name="TextBox 15">
+            <a:extLst>
+              <a:ext uri="{FF2B5EF4-FFF2-40B4-BE49-F238E27FC236}">
+                <a16:creationId xmlns:a16="http://schemas.microsoft.com/office/drawing/2014/main" id="{887437D5-66CD-44E4-B951-F5A8A9D7C6A3}"/>
               </a:ext>
             </a:extLst>
           </p:cNvPr>
@@ -5609,8 +5742,8 @@
         </p:nvSpPr>
         <p:spPr>
           <a:xfrm>
-            <a:off x="746760" y="416560"/>
-            <a:ext cx="10095264" cy="369332"/>
+            <a:off x="441960" y="421640"/>
+            <a:ext cx="5000087" cy="369332"/>
           </a:xfrm>
           <a:prstGeom prst="rect">
             <a:avLst/>
@@ -5625,15 +5758,7 @@
           <a:p>
             <a:r>
               <a:rPr lang="en-US" dirty="0"/>
-              <a:t>The </a:t>
-            </a:r>
-            <a:r>
-              <a:rPr lang="en-US" dirty="0" err="1"/>
-              <a:t>javascript</a:t>
-            </a:r>
-            <a:r>
-              <a:rPr lang="en-US" dirty="0"/>
-              <a:t> event loop runs single-threaded and waits for something to happen via a callback function…</a:t>
+              <a:t>Via the closure, each client can have its own state…</a:t>
             </a:r>
           </a:p>
         </p:txBody>
@@ -5641,7 +5766,7 @@
     </p:spTree>
     <p:extLst>
       <p:ext uri="{BB962C8B-B14F-4D97-AF65-F5344CB8AC3E}">
-        <p14:creationId xmlns:p14="http://schemas.microsoft.com/office/powerpoint/2010/main" val="166226061"/>
+        <p14:creationId xmlns:p14="http://schemas.microsoft.com/office/powerpoint/2010/main" val="550491013"/>
       </p:ext>
     </p:extLst>
   </p:cSld>
@@ -5796,77 +5921,50 @@
       </p:grpSpPr>
       <p:pic>
         <p:nvPicPr>
-          <p:cNvPr id="6146" name="Picture 2"/>
+          <p:cNvPr id="4" name="Picture 3">
+            <a:extLst>
+              <a:ext uri="{FF2B5EF4-FFF2-40B4-BE49-F238E27FC236}">
+                <a16:creationId xmlns:a16="http://schemas.microsoft.com/office/drawing/2014/main" id="{B1C3CA1B-30D8-4E4B-B2DD-B48214B3A971}"/>
+              </a:ext>
+            </a:extLst>
+          </p:cNvPr>
           <p:cNvPicPr>
-            <a:picLocks noChangeAspect="1" noChangeArrowheads="1"/>
+            <a:picLocks noChangeAspect="1"/>
           </p:cNvPicPr>
           <p:nvPr/>
         </p:nvPicPr>
         <p:blipFill>
-          <a:blip r:embed="rId3" cstate="print"/>
-          <a:srcRect/>
+          <a:blip r:embed="rId2"/>
           <a:stretch>
             <a:fillRect/>
           </a:stretch>
         </p:blipFill>
-        <p:spPr bwMode="auto">
-          <a:xfrm>
-            <a:off x="2514600" y="1600200"/>
-            <a:ext cx="5429250" cy="2628900"/>
+        <p:spPr>
+          <a:xfrm>
+            <a:off x="2676751" y="1530795"/>
+            <a:ext cx="6634526" cy="4541520"/>
           </a:xfrm>
           <a:prstGeom prst="rect">
             <a:avLst/>
           </a:prstGeom>
-          <a:noFill/>
-          <a:ln w="9525">
-            <a:noFill/>
-            <a:miter lim="800000"/>
-            <a:headEnd/>
-            <a:tailEnd/>
-          </a:ln>
         </p:spPr>
       </p:pic>
       <p:sp>
         <p:nvSpPr>
-          <p:cNvPr id="5" name="Rectangle 4"/>
-          <p:cNvSpPr/>
-          <p:nvPr/>
-        </p:nvSpPr>
-        <p:spPr>
-          <a:xfrm>
-            <a:off x="2438400" y="5943600"/>
-            <a:ext cx="5791200" cy="369332"/>
-          </a:xfrm>
-          <a:prstGeom prst="rect">
-            <a:avLst/>
-          </a:prstGeom>
-        </p:spPr>
-        <p:txBody>
-          <a:bodyPr wrap="square">
-            <a:spAutoFit/>
-          </a:bodyPr>
-          <a:lstStyle/>
-          <a:p>
-            <a:r>
-              <a:rPr lang="en-US" dirty="0">
-                <a:hlinkClick r:id="rId4"/>
-              </a:rPr>
-              <a:t>http://www.kirkdorffer.com/jspspecs/images/scenario2.jpg</a:t>
-            </a:r>
-            <a:endParaRPr lang="en-US" dirty="0"/>
-          </a:p>
-        </p:txBody>
-      </p:sp>
-      <p:sp>
-        <p:nvSpPr>
-          <p:cNvPr id="6" name="TextBox 5"/>
+          <p:cNvPr id="5" name="TextBox 4">
+            <a:extLst>
+              <a:ext uri="{FF2B5EF4-FFF2-40B4-BE49-F238E27FC236}">
+                <a16:creationId xmlns:a16="http://schemas.microsoft.com/office/drawing/2014/main" id="{64316802-128B-4783-952A-4240FF36E138}"/>
+              </a:ext>
+            </a:extLst>
+          </p:cNvPr>
           <p:cNvSpPr txBox="1"/>
           <p:nvPr/>
         </p:nvSpPr>
         <p:spPr>
           <a:xfrm>
-            <a:off x="2057401" y="533400"/>
-            <a:ext cx="7618560" cy="646331"/>
+            <a:off x="746760" y="416560"/>
+            <a:ext cx="10095264" cy="369332"/>
           </a:xfrm>
           <a:prstGeom prst="rect">
             <a:avLst/>
@@ -5881,13 +5979,50 @@
           <a:p>
             <a:r>
               <a:rPr lang="en-US" dirty="0"/>
-              <a:t>Compare this to the java/servlet web cycle where each request to a servlet can </a:t>
-            </a:r>
-          </a:p>
-          <a:p>
-            <a:r>
-              <a:rPr lang="en-US" dirty="0"/>
-              <a:t>(potentially) start a new thread…</a:t>
+              <a:t>The </a:t>
+            </a:r>
+            <a:r>
+              <a:rPr lang="en-US" dirty="0" err="1"/>
+              <a:t>javascript</a:t>
+            </a:r>
+            <a:r>
+              <a:rPr lang="en-US" dirty="0"/>
+              <a:t> event loop runs single-threaded and waits for something to happen via a callback function…</a:t>
+            </a:r>
+          </a:p>
+        </p:txBody>
+      </p:sp>
+      <p:sp>
+        <p:nvSpPr>
+          <p:cNvPr id="2" name="TextBox 1">
+            <a:extLst>
+              <a:ext uri="{FF2B5EF4-FFF2-40B4-BE49-F238E27FC236}">
+                <a16:creationId xmlns:a16="http://schemas.microsoft.com/office/drawing/2014/main" id="{7C44CA18-ADC8-4F08-BE4A-6A1EF095500D}"/>
+              </a:ext>
+            </a:extLst>
+          </p:cNvPr>
+          <p:cNvSpPr txBox="1"/>
+          <p:nvPr/>
+        </p:nvSpPr>
+        <p:spPr>
+          <a:xfrm>
+            <a:off x="1056904" y="6222670"/>
+            <a:ext cx="2241960" cy="369332"/>
+          </a:xfrm>
+          <a:prstGeom prst="rect">
+            <a:avLst/>
+          </a:prstGeom>
+          <a:noFill/>
+        </p:spPr>
+        <p:txBody>
+          <a:bodyPr wrap="none" rtlCol="0">
+            <a:spAutoFit/>
+          </a:bodyPr>
+          <a:lstStyle/>
+          <a:p>
+            <a:r>
+              <a:rPr lang="en-US" dirty="0"/>
+              <a:t>Node.js: the right way</a:t>
             </a:r>
           </a:p>
         </p:txBody>
@@ -5895,7 +6030,7 @@
     </p:spTree>
     <p:extLst>
       <p:ext uri="{BB962C8B-B14F-4D97-AF65-F5344CB8AC3E}">
-        <p14:creationId xmlns:p14="http://schemas.microsoft.com/office/powerpoint/2010/main" val="1369215109"/>
+        <p14:creationId xmlns:p14="http://schemas.microsoft.com/office/powerpoint/2010/main" val="166226061"/>
       </p:ext>
     </p:extLst>
   </p:cSld>
@@ -5922,181 +6057,79 @@
           <a:chExt cx="0" cy="0"/>
         </a:xfrm>
       </p:grpSpPr>
-      <p:cxnSp>
-        <p:nvCxnSpPr>
-          <p:cNvPr id="5" name="Straight Connector 4">
-            <a:extLst>
-              <a:ext uri="{FF2B5EF4-FFF2-40B4-BE49-F238E27FC236}">
-                <a16:creationId xmlns:a16="http://schemas.microsoft.com/office/drawing/2014/main" id="{78AE749F-0CFA-44AE-AEB6-867161D5479C}"/>
-              </a:ext>
-            </a:extLst>
-          </p:cNvPr>
-          <p:cNvCxnSpPr/>
-          <p:nvPr/>
-        </p:nvCxnSpPr>
-        <p:spPr>
-          <a:xfrm>
-            <a:off x="6085840" y="289560"/>
-            <a:ext cx="0" cy="5679440"/>
-          </a:xfrm>
-          <a:prstGeom prst="line">
-            <a:avLst/>
-          </a:prstGeom>
-        </p:spPr>
-        <p:style>
-          <a:lnRef idx="1">
-            <a:schemeClr val="accent1"/>
-          </a:lnRef>
-          <a:fillRef idx="0">
-            <a:schemeClr val="accent1"/>
-          </a:fillRef>
-          <a:effectRef idx="0">
-            <a:schemeClr val="accent1"/>
-          </a:effectRef>
-          <a:fontRef idx="minor">
-            <a:schemeClr val="tx1"/>
-          </a:fontRef>
-        </p:style>
-      </p:cxnSp>
-      <p:sp>
-        <p:nvSpPr>
-          <p:cNvPr id="6" name="TextBox 5">
-            <a:extLst>
-              <a:ext uri="{FF2B5EF4-FFF2-40B4-BE49-F238E27FC236}">
-                <a16:creationId xmlns:a16="http://schemas.microsoft.com/office/drawing/2014/main" id="{46D66D13-D7F5-4894-82EC-220FA7A85AAD}"/>
-              </a:ext>
-            </a:extLst>
-          </p:cNvPr>
-          <p:cNvSpPr txBox="1"/>
-          <p:nvPr/>
-        </p:nvSpPr>
-        <p:spPr>
-          <a:xfrm>
-            <a:off x="1275080" y="60960"/>
-            <a:ext cx="4241418" cy="3416320"/>
-          </a:xfrm>
-          <a:prstGeom prst="rect">
-            <a:avLst/>
-          </a:prstGeom>
-          <a:noFill/>
-        </p:spPr>
-        <p:txBody>
-          <a:bodyPr wrap="none" rtlCol="0">
-            <a:spAutoFit/>
-          </a:bodyPr>
-          <a:lstStyle/>
-          <a:p>
-            <a:r>
-              <a:rPr lang="en-US" dirty="0" err="1"/>
-              <a:t>Javascript</a:t>
-            </a:r>
-            <a:r>
-              <a:rPr lang="en-US" dirty="0"/>
-              <a:t> server</a:t>
-            </a:r>
-          </a:p>
-          <a:p>
-            <a:endParaRPr lang="en-US" dirty="0"/>
-          </a:p>
-          <a:p>
-            <a:r>
-              <a:rPr lang="en-US" dirty="0"/>
-              <a:t>Synchronous startup-</a:t>
-            </a:r>
-          </a:p>
-          <a:p>
-            <a:r>
-              <a:rPr lang="en-US" dirty="0"/>
-              <a:t>Load libraries and other startup tasks that </a:t>
-            </a:r>
-          </a:p>
-          <a:p>
-            <a:r>
-              <a:rPr lang="en-US" dirty="0"/>
-              <a:t>might be slow</a:t>
-            </a:r>
-          </a:p>
-          <a:p>
-            <a:endParaRPr lang="en-US" dirty="0"/>
-          </a:p>
-          <a:p>
-            <a:r>
-              <a:rPr lang="en-US" dirty="0"/>
-              <a:t>Asynchronous serving- </a:t>
-            </a:r>
-          </a:p>
-          <a:p>
-            <a:r>
-              <a:rPr lang="en-US" dirty="0"/>
-              <a:t>Slow things must be relegated to a server</a:t>
-            </a:r>
-          </a:p>
-          <a:p>
-            <a:r>
-              <a:rPr lang="en-US" dirty="0"/>
-              <a:t>or background process or otherwise off the</a:t>
-            </a:r>
-          </a:p>
-          <a:p>
-            <a:r>
-              <a:rPr lang="en-US" dirty="0"/>
-              <a:t>event loop </a:t>
-            </a:r>
-          </a:p>
-          <a:p>
-            <a:endParaRPr lang="en-US" dirty="0"/>
-          </a:p>
-          <a:p>
-            <a:endParaRPr lang="en-US" dirty="0"/>
-          </a:p>
-        </p:txBody>
-      </p:sp>
       <p:pic>
         <p:nvPicPr>
-          <p:cNvPr id="7" name="Picture 6">
-            <a:extLst>
-              <a:ext uri="{FF2B5EF4-FFF2-40B4-BE49-F238E27FC236}">
-                <a16:creationId xmlns:a16="http://schemas.microsoft.com/office/drawing/2014/main" id="{24ED52A8-ABD1-4D4D-A765-12760D3A5D4A}"/>
-              </a:ext>
-            </a:extLst>
-          </p:cNvPr>
+          <p:cNvPr id="6146" name="Picture 2"/>
           <p:cNvPicPr>
-            <a:picLocks noChangeAspect="1"/>
+            <a:picLocks noChangeAspect="1" noChangeArrowheads="1"/>
           </p:cNvPicPr>
           <p:nvPr/>
         </p:nvPicPr>
         <p:blipFill>
-          <a:blip r:embed="rId3"/>
+          <a:blip r:embed="rId3" cstate="print"/>
+          <a:srcRect/>
           <a:stretch>
             <a:fillRect/>
           </a:stretch>
         </p:blipFill>
-        <p:spPr>
-          <a:xfrm>
-            <a:off x="1224971" y="2809240"/>
-            <a:ext cx="4022670" cy="2753631"/>
+        <p:spPr bwMode="auto">
+          <a:xfrm>
+            <a:off x="2514600" y="1600200"/>
+            <a:ext cx="5429250" cy="2628900"/>
           </a:xfrm>
           <a:prstGeom prst="rect">
             <a:avLst/>
           </a:prstGeom>
+          <a:noFill/>
+          <a:ln w="9525">
+            <a:noFill/>
+            <a:miter lim="800000"/>
+            <a:headEnd/>
+            <a:tailEnd/>
+          </a:ln>
         </p:spPr>
       </p:pic>
       <p:sp>
         <p:nvSpPr>
-          <p:cNvPr id="9" name="TextBox 8">
-            <a:extLst>
-              <a:ext uri="{FF2B5EF4-FFF2-40B4-BE49-F238E27FC236}">
-                <a16:creationId xmlns:a16="http://schemas.microsoft.com/office/drawing/2014/main" id="{882BD054-834B-4D33-BE2A-1C54C88F6E2B}"/>
-              </a:ext>
-            </a:extLst>
-          </p:cNvPr>
+          <p:cNvPr id="5" name="Rectangle 4"/>
+          <p:cNvSpPr/>
+          <p:nvPr/>
+        </p:nvSpPr>
+        <p:spPr>
+          <a:xfrm>
+            <a:off x="2438400" y="5943600"/>
+            <a:ext cx="5791200" cy="369332"/>
+          </a:xfrm>
+          <a:prstGeom prst="rect">
+            <a:avLst/>
+          </a:prstGeom>
+        </p:spPr>
+        <p:txBody>
+          <a:bodyPr wrap="square">
+            <a:spAutoFit/>
+          </a:bodyPr>
+          <a:lstStyle/>
+          <a:p>
+            <a:r>
+              <a:rPr lang="en-US" dirty="0">
+                <a:hlinkClick r:id="rId4"/>
+              </a:rPr>
+              <a:t>http://www.kirkdorffer.com/jspspecs/images/scenario2.jpg</a:t>
+            </a:r>
+            <a:endParaRPr lang="en-US" dirty="0"/>
+          </a:p>
+        </p:txBody>
+      </p:sp>
+      <p:sp>
+        <p:nvSpPr>
+          <p:cNvPr id="6" name="TextBox 5"/>
           <p:cNvSpPr txBox="1"/>
           <p:nvPr/>
         </p:nvSpPr>
         <p:spPr>
           <a:xfrm>
-            <a:off x="1026160" y="5334000"/>
-            <a:ext cx="4805611" cy="1200329"/>
+            <a:off x="2057401" y="533400"/>
+            <a:ext cx="7618560" cy="646331"/>
           </a:xfrm>
           <a:prstGeom prst="rect">
             <a:avLst/>
@@ -6111,169 +6144,13 @@
           <a:p>
             <a:r>
               <a:rPr lang="en-US" dirty="0"/>
-              <a:t>When the slow things gets done, call back </a:t>
-            </a:r>
-          </a:p>
-          <a:p>
-            <a:r>
-              <a:rPr lang="en-US" dirty="0"/>
-              <a:t>To the asynchronous event loop.</a:t>
-            </a:r>
-          </a:p>
-          <a:p>
-            <a:endParaRPr lang="en-US" dirty="0"/>
-          </a:p>
-          <a:p>
-            <a:r>
-              <a:rPr lang="en-US" dirty="0"/>
-              <a:t>None of your code in the event loop should block</a:t>
-            </a:r>
-          </a:p>
-        </p:txBody>
-      </p:sp>
-      <p:sp>
-        <p:nvSpPr>
-          <p:cNvPr id="10" name="Rectangle 9">
-            <a:extLst>
-              <a:ext uri="{FF2B5EF4-FFF2-40B4-BE49-F238E27FC236}">
-                <a16:creationId xmlns:a16="http://schemas.microsoft.com/office/drawing/2014/main" id="{ECDA9780-1CC9-4776-8C4C-40BF1EB7218D}"/>
-              </a:ext>
-            </a:extLst>
-          </p:cNvPr>
-          <p:cNvSpPr/>
-          <p:nvPr/>
-        </p:nvSpPr>
-        <p:spPr>
-          <a:xfrm>
-            <a:off x="7068569" y="55880"/>
-            <a:ext cx="1214435" cy="369332"/>
-          </a:xfrm>
-          <a:prstGeom prst="rect">
-            <a:avLst/>
-          </a:prstGeom>
-        </p:spPr>
-        <p:txBody>
-          <a:bodyPr wrap="none">
-            <a:spAutoFit/>
-          </a:bodyPr>
-          <a:lstStyle/>
-          <a:p>
-            <a:r>
-              <a:rPr lang="en-US" dirty="0"/>
-              <a:t>Java server</a:t>
-            </a:r>
-          </a:p>
-        </p:txBody>
-      </p:sp>
-      <p:sp>
-        <p:nvSpPr>
-          <p:cNvPr id="11" name="Rectangle 10">
-            <a:extLst>
-              <a:ext uri="{FF2B5EF4-FFF2-40B4-BE49-F238E27FC236}">
-                <a16:creationId xmlns:a16="http://schemas.microsoft.com/office/drawing/2014/main" id="{FF247AFC-FB18-4AC9-AABC-6FEA03C6D302}"/>
-              </a:ext>
-            </a:extLst>
-          </p:cNvPr>
-          <p:cNvSpPr/>
-          <p:nvPr/>
-        </p:nvSpPr>
-        <p:spPr>
-          <a:xfrm>
-            <a:off x="6354697" y="676255"/>
-            <a:ext cx="6096000" cy="923330"/>
-          </a:xfrm>
-          <a:prstGeom prst="rect">
-            <a:avLst/>
-          </a:prstGeom>
-        </p:spPr>
-        <p:txBody>
-          <a:bodyPr>
-            <a:spAutoFit/>
-          </a:bodyPr>
-          <a:lstStyle/>
-          <a:p>
-            <a:r>
-              <a:rPr lang="en-US" dirty="0"/>
-              <a:t>Single threaded startup-</a:t>
-            </a:r>
-          </a:p>
-          <a:p>
-            <a:r>
-              <a:rPr lang="en-US" dirty="0"/>
-              <a:t>Load libraries and other startup tasks that </a:t>
-            </a:r>
-          </a:p>
-          <a:p>
-            <a:r>
-              <a:rPr lang="en-US" dirty="0"/>
-              <a:t>might be slow</a:t>
-            </a:r>
-          </a:p>
-        </p:txBody>
-      </p:sp>
-      <p:sp>
-        <p:nvSpPr>
-          <p:cNvPr id="12" name="Rectangle 11">
-            <a:extLst>
-              <a:ext uri="{FF2B5EF4-FFF2-40B4-BE49-F238E27FC236}">
-                <a16:creationId xmlns:a16="http://schemas.microsoft.com/office/drawing/2014/main" id="{5DE6B27D-7F5B-49A7-B441-EDCADE9F7DA3}"/>
-              </a:ext>
-            </a:extLst>
-          </p:cNvPr>
-          <p:cNvSpPr/>
-          <p:nvPr/>
-        </p:nvSpPr>
-        <p:spPr>
-          <a:xfrm>
-            <a:off x="6309360" y="1762036"/>
-            <a:ext cx="6096000" cy="2031325"/>
-          </a:xfrm>
-          <a:prstGeom prst="rect">
-            <a:avLst/>
-          </a:prstGeom>
-        </p:spPr>
-        <p:txBody>
-          <a:bodyPr>
-            <a:spAutoFit/>
-          </a:bodyPr>
-          <a:lstStyle/>
-          <a:p>
-            <a:r>
-              <a:rPr lang="en-US" dirty="0"/>
-              <a:t>Multi-threaded serving- </a:t>
-            </a:r>
-          </a:p>
-          <a:p>
-            <a:r>
-              <a:rPr lang="en-US" dirty="0"/>
-              <a:t>Each request can be handled in its own thread</a:t>
-            </a:r>
-          </a:p>
-          <a:p>
-            <a:r>
-              <a:rPr lang="en-US" dirty="0"/>
-              <a:t>Any individual thread can block </a:t>
-            </a:r>
-          </a:p>
-          <a:p>
-            <a:r>
-              <a:rPr lang="en-US" dirty="0"/>
-              <a:t>(as long as there are still some threads to handle the </a:t>
-            </a:r>
-          </a:p>
-          <a:p>
-            <a:r>
-              <a:rPr lang="en-US" dirty="0"/>
-              <a:t>new requests)</a:t>
-            </a:r>
-          </a:p>
-          <a:p>
-            <a:endParaRPr lang="en-US" dirty="0"/>
-          </a:p>
-          <a:p>
-            <a:r>
-              <a:rPr lang="en-US" dirty="0"/>
-              <a:t>Allow for shared access to mutable data structures.</a:t>
+              <a:t>Compare this to the java/servlet web cycle where each request to a servlet can </a:t>
+            </a:r>
+          </a:p>
+          <a:p>
+            <a:r>
+              <a:rPr lang="en-US" dirty="0"/>
+              <a:t>(potentially) start a new thread…</a:t>
             </a:r>
           </a:p>
         </p:txBody>
@@ -6281,7 +6158,7 @@
     </p:spTree>
     <p:extLst>
       <p:ext uri="{BB962C8B-B14F-4D97-AF65-F5344CB8AC3E}">
-        <p14:creationId xmlns:p14="http://schemas.microsoft.com/office/powerpoint/2010/main" val="3373104060"/>
+        <p14:creationId xmlns:p14="http://schemas.microsoft.com/office/powerpoint/2010/main" val="1369215109"/>
       </p:ext>
     </p:extLst>
   </p:cSld>
@@ -6308,111 +6185,12 @@
           <a:chExt cx="0" cy="0"/>
         </a:xfrm>
       </p:grpSpPr>
-      <p:sp>
-        <p:nvSpPr>
-          <p:cNvPr id="4" name="TextBox 3">
-            <a:extLst>
-              <a:ext uri="{FF2B5EF4-FFF2-40B4-BE49-F238E27FC236}">
-                <a16:creationId xmlns:a16="http://schemas.microsoft.com/office/drawing/2014/main" id="{D0BF688F-5180-47A9-91F5-B2A02EE96F20}"/>
-              </a:ext>
-            </a:extLst>
-          </p:cNvPr>
-          <p:cNvSpPr txBox="1"/>
-          <p:nvPr/>
-        </p:nvSpPr>
-        <p:spPr>
-          <a:xfrm>
-            <a:off x="584200" y="10160"/>
-            <a:ext cx="5228226" cy="369332"/>
-          </a:xfrm>
-          <a:prstGeom prst="rect">
-            <a:avLst/>
-          </a:prstGeom>
-          <a:noFill/>
-        </p:spPr>
-        <p:txBody>
-          <a:bodyPr wrap="none" rtlCol="0">
-            <a:spAutoFit/>
-          </a:bodyPr>
-          <a:lstStyle/>
-          <a:p>
-            <a:r>
-              <a:rPr lang="en-US" dirty="0"/>
-              <a:t>With lack of overhead, node.js </a:t>
-            </a:r>
-            <a:r>
-              <a:rPr lang="en-US"/>
-              <a:t>can actually be faster…</a:t>
-            </a:r>
-          </a:p>
-        </p:txBody>
-      </p:sp>
-      <p:pic>
-        <p:nvPicPr>
-          <p:cNvPr id="5" name="Picture 4">
-            <a:extLst>
-              <a:ext uri="{FF2B5EF4-FFF2-40B4-BE49-F238E27FC236}">
-                <a16:creationId xmlns:a16="http://schemas.microsoft.com/office/drawing/2014/main" id="{112A6C43-0C52-4922-A620-76F6A9443EC2}"/>
-              </a:ext>
-            </a:extLst>
-          </p:cNvPr>
-          <p:cNvPicPr>
-            <a:picLocks noChangeAspect="1"/>
-          </p:cNvPicPr>
-          <p:nvPr/>
-        </p:nvPicPr>
-        <p:blipFill>
-          <a:blip r:embed="rId3"/>
-          <a:stretch>
-            <a:fillRect/>
-          </a:stretch>
-        </p:blipFill>
-        <p:spPr>
-          <a:xfrm>
-            <a:off x="206319" y="690881"/>
-            <a:ext cx="5290241" cy="3017538"/>
-          </a:xfrm>
-          <a:prstGeom prst="rect">
-            <a:avLst/>
-          </a:prstGeom>
-        </p:spPr>
-      </p:pic>
-      <p:pic>
-        <p:nvPicPr>
-          <p:cNvPr id="6" name="Picture 5">
-            <a:extLst>
-              <a:ext uri="{FF2B5EF4-FFF2-40B4-BE49-F238E27FC236}">
-                <a16:creationId xmlns:a16="http://schemas.microsoft.com/office/drawing/2014/main" id="{24EA2C7A-88E7-4625-84F1-22975DFB63D0}"/>
-              </a:ext>
-            </a:extLst>
-          </p:cNvPr>
-          <p:cNvPicPr>
-            <a:picLocks noChangeAspect="1"/>
-          </p:cNvPicPr>
-          <p:nvPr/>
-        </p:nvPicPr>
-        <p:blipFill>
-          <a:blip r:embed="rId4"/>
-          <a:stretch>
-            <a:fillRect/>
-          </a:stretch>
-        </p:blipFill>
-        <p:spPr>
-          <a:xfrm>
-            <a:off x="6144661" y="2484120"/>
-            <a:ext cx="4934819" cy="3972948"/>
-          </a:xfrm>
-          <a:prstGeom prst="rect">
-            <a:avLst/>
-          </a:prstGeom>
-        </p:spPr>
-      </p:pic>
       <p:cxnSp>
         <p:nvCxnSpPr>
-          <p:cNvPr id="8" name="Straight Connector 7">
-            <a:extLst>
-              <a:ext uri="{FF2B5EF4-FFF2-40B4-BE49-F238E27FC236}">
-                <a16:creationId xmlns:a16="http://schemas.microsoft.com/office/drawing/2014/main" id="{BF83557F-4DC7-4D96-AD49-A5DFA28602A4}"/>
+          <p:cNvPr id="5" name="Straight Connector 4">
+            <a:extLst>
+              <a:ext uri="{FF2B5EF4-FFF2-40B4-BE49-F238E27FC236}">
+                <a16:creationId xmlns:a16="http://schemas.microsoft.com/office/drawing/2014/main" id="{78AE749F-0CFA-44AE-AEB6-867161D5479C}"/>
               </a:ext>
             </a:extLst>
           </p:cNvPr>
@@ -6421,8 +6199,8 @@
         </p:nvCxnSpPr>
         <p:spPr>
           <a:xfrm>
-            <a:off x="5857240" y="142240"/>
-            <a:ext cx="0" cy="6578600"/>
+            <a:off x="6085840" y="289560"/>
+            <a:ext cx="0" cy="5679440"/>
           </a:xfrm>
           <a:prstGeom prst="line">
             <a:avLst/>
@@ -6445,6 +6223,491 @@
       </p:cxnSp>
       <p:sp>
         <p:nvSpPr>
+          <p:cNvPr id="6" name="TextBox 5">
+            <a:extLst>
+              <a:ext uri="{FF2B5EF4-FFF2-40B4-BE49-F238E27FC236}">
+                <a16:creationId xmlns:a16="http://schemas.microsoft.com/office/drawing/2014/main" id="{46D66D13-D7F5-4894-82EC-220FA7A85AAD}"/>
+              </a:ext>
+            </a:extLst>
+          </p:cNvPr>
+          <p:cNvSpPr txBox="1"/>
+          <p:nvPr/>
+        </p:nvSpPr>
+        <p:spPr>
+          <a:xfrm>
+            <a:off x="1275080" y="60960"/>
+            <a:ext cx="4241418" cy="3416320"/>
+          </a:xfrm>
+          <a:prstGeom prst="rect">
+            <a:avLst/>
+          </a:prstGeom>
+          <a:noFill/>
+        </p:spPr>
+        <p:txBody>
+          <a:bodyPr wrap="none" rtlCol="0">
+            <a:spAutoFit/>
+          </a:bodyPr>
+          <a:lstStyle/>
+          <a:p>
+            <a:r>
+              <a:rPr lang="en-US" dirty="0" err="1"/>
+              <a:t>Javascript</a:t>
+            </a:r>
+            <a:r>
+              <a:rPr lang="en-US" dirty="0"/>
+              <a:t> server</a:t>
+            </a:r>
+          </a:p>
+          <a:p>
+            <a:endParaRPr lang="en-US" dirty="0"/>
+          </a:p>
+          <a:p>
+            <a:r>
+              <a:rPr lang="en-US" dirty="0"/>
+              <a:t>Synchronous startup-</a:t>
+            </a:r>
+          </a:p>
+          <a:p>
+            <a:r>
+              <a:rPr lang="en-US" dirty="0"/>
+              <a:t>Load libraries and other startup tasks that </a:t>
+            </a:r>
+          </a:p>
+          <a:p>
+            <a:r>
+              <a:rPr lang="en-US" dirty="0"/>
+              <a:t>might be slow</a:t>
+            </a:r>
+          </a:p>
+          <a:p>
+            <a:endParaRPr lang="en-US" dirty="0"/>
+          </a:p>
+          <a:p>
+            <a:r>
+              <a:rPr lang="en-US" dirty="0"/>
+              <a:t>Asynchronous serving- </a:t>
+            </a:r>
+          </a:p>
+          <a:p>
+            <a:r>
+              <a:rPr lang="en-US" dirty="0"/>
+              <a:t>Slow things must be relegated to a server</a:t>
+            </a:r>
+          </a:p>
+          <a:p>
+            <a:r>
+              <a:rPr lang="en-US" dirty="0"/>
+              <a:t>or background process or otherwise off the</a:t>
+            </a:r>
+          </a:p>
+          <a:p>
+            <a:r>
+              <a:rPr lang="en-US" dirty="0"/>
+              <a:t>event loop </a:t>
+            </a:r>
+          </a:p>
+          <a:p>
+            <a:endParaRPr lang="en-US" dirty="0"/>
+          </a:p>
+          <a:p>
+            <a:endParaRPr lang="en-US" dirty="0"/>
+          </a:p>
+        </p:txBody>
+      </p:sp>
+      <p:pic>
+        <p:nvPicPr>
+          <p:cNvPr id="7" name="Picture 6">
+            <a:extLst>
+              <a:ext uri="{FF2B5EF4-FFF2-40B4-BE49-F238E27FC236}">
+                <a16:creationId xmlns:a16="http://schemas.microsoft.com/office/drawing/2014/main" id="{24ED52A8-ABD1-4D4D-A765-12760D3A5D4A}"/>
+              </a:ext>
+            </a:extLst>
+          </p:cNvPr>
+          <p:cNvPicPr>
+            <a:picLocks noChangeAspect="1"/>
+          </p:cNvPicPr>
+          <p:nvPr/>
+        </p:nvPicPr>
+        <p:blipFill>
+          <a:blip r:embed="rId3"/>
+          <a:stretch>
+            <a:fillRect/>
+          </a:stretch>
+        </p:blipFill>
+        <p:spPr>
+          <a:xfrm>
+            <a:off x="1224971" y="2809240"/>
+            <a:ext cx="4022670" cy="2753631"/>
+          </a:xfrm>
+          <a:prstGeom prst="rect">
+            <a:avLst/>
+          </a:prstGeom>
+        </p:spPr>
+      </p:pic>
+      <p:sp>
+        <p:nvSpPr>
+          <p:cNvPr id="9" name="TextBox 8">
+            <a:extLst>
+              <a:ext uri="{FF2B5EF4-FFF2-40B4-BE49-F238E27FC236}">
+                <a16:creationId xmlns:a16="http://schemas.microsoft.com/office/drawing/2014/main" id="{882BD054-834B-4D33-BE2A-1C54C88F6E2B}"/>
+              </a:ext>
+            </a:extLst>
+          </p:cNvPr>
+          <p:cNvSpPr txBox="1"/>
+          <p:nvPr/>
+        </p:nvSpPr>
+        <p:spPr>
+          <a:xfrm>
+            <a:off x="1026160" y="5334000"/>
+            <a:ext cx="4805611" cy="1200329"/>
+          </a:xfrm>
+          <a:prstGeom prst="rect">
+            <a:avLst/>
+          </a:prstGeom>
+          <a:noFill/>
+        </p:spPr>
+        <p:txBody>
+          <a:bodyPr wrap="none" rtlCol="0">
+            <a:spAutoFit/>
+          </a:bodyPr>
+          <a:lstStyle/>
+          <a:p>
+            <a:r>
+              <a:rPr lang="en-US" dirty="0"/>
+              <a:t>When the slow things gets done, call back </a:t>
+            </a:r>
+          </a:p>
+          <a:p>
+            <a:r>
+              <a:rPr lang="en-US" dirty="0"/>
+              <a:t>To the asynchronous event loop.</a:t>
+            </a:r>
+          </a:p>
+          <a:p>
+            <a:endParaRPr lang="en-US" dirty="0"/>
+          </a:p>
+          <a:p>
+            <a:r>
+              <a:rPr lang="en-US" dirty="0"/>
+              <a:t>None of your code in the event loop should block</a:t>
+            </a:r>
+          </a:p>
+        </p:txBody>
+      </p:sp>
+      <p:sp>
+        <p:nvSpPr>
+          <p:cNvPr id="10" name="Rectangle 9">
+            <a:extLst>
+              <a:ext uri="{FF2B5EF4-FFF2-40B4-BE49-F238E27FC236}">
+                <a16:creationId xmlns:a16="http://schemas.microsoft.com/office/drawing/2014/main" id="{ECDA9780-1CC9-4776-8C4C-40BF1EB7218D}"/>
+              </a:ext>
+            </a:extLst>
+          </p:cNvPr>
+          <p:cNvSpPr/>
+          <p:nvPr/>
+        </p:nvSpPr>
+        <p:spPr>
+          <a:xfrm>
+            <a:off x="7068569" y="55880"/>
+            <a:ext cx="1214435" cy="369332"/>
+          </a:xfrm>
+          <a:prstGeom prst="rect">
+            <a:avLst/>
+          </a:prstGeom>
+        </p:spPr>
+        <p:txBody>
+          <a:bodyPr wrap="none">
+            <a:spAutoFit/>
+          </a:bodyPr>
+          <a:lstStyle/>
+          <a:p>
+            <a:r>
+              <a:rPr lang="en-US" dirty="0"/>
+              <a:t>Java server</a:t>
+            </a:r>
+          </a:p>
+        </p:txBody>
+      </p:sp>
+      <p:sp>
+        <p:nvSpPr>
+          <p:cNvPr id="11" name="Rectangle 10">
+            <a:extLst>
+              <a:ext uri="{FF2B5EF4-FFF2-40B4-BE49-F238E27FC236}">
+                <a16:creationId xmlns:a16="http://schemas.microsoft.com/office/drawing/2014/main" id="{FF247AFC-FB18-4AC9-AABC-6FEA03C6D302}"/>
+              </a:ext>
+            </a:extLst>
+          </p:cNvPr>
+          <p:cNvSpPr/>
+          <p:nvPr/>
+        </p:nvSpPr>
+        <p:spPr>
+          <a:xfrm>
+            <a:off x="6354697" y="676255"/>
+            <a:ext cx="6096000" cy="923330"/>
+          </a:xfrm>
+          <a:prstGeom prst="rect">
+            <a:avLst/>
+          </a:prstGeom>
+        </p:spPr>
+        <p:txBody>
+          <a:bodyPr>
+            <a:spAutoFit/>
+          </a:bodyPr>
+          <a:lstStyle/>
+          <a:p>
+            <a:r>
+              <a:rPr lang="en-US" dirty="0"/>
+              <a:t>Single threaded startup-</a:t>
+            </a:r>
+          </a:p>
+          <a:p>
+            <a:r>
+              <a:rPr lang="en-US" dirty="0"/>
+              <a:t>Load libraries and other startup tasks that </a:t>
+            </a:r>
+          </a:p>
+          <a:p>
+            <a:r>
+              <a:rPr lang="en-US" dirty="0"/>
+              <a:t>might be slow</a:t>
+            </a:r>
+          </a:p>
+        </p:txBody>
+      </p:sp>
+      <p:sp>
+        <p:nvSpPr>
+          <p:cNvPr id="12" name="Rectangle 11">
+            <a:extLst>
+              <a:ext uri="{FF2B5EF4-FFF2-40B4-BE49-F238E27FC236}">
+                <a16:creationId xmlns:a16="http://schemas.microsoft.com/office/drawing/2014/main" id="{5DE6B27D-7F5B-49A7-B441-EDCADE9F7DA3}"/>
+              </a:ext>
+            </a:extLst>
+          </p:cNvPr>
+          <p:cNvSpPr/>
+          <p:nvPr/>
+        </p:nvSpPr>
+        <p:spPr>
+          <a:xfrm>
+            <a:off x="6309360" y="1762036"/>
+            <a:ext cx="6096000" cy="2031325"/>
+          </a:xfrm>
+          <a:prstGeom prst="rect">
+            <a:avLst/>
+          </a:prstGeom>
+        </p:spPr>
+        <p:txBody>
+          <a:bodyPr>
+            <a:spAutoFit/>
+          </a:bodyPr>
+          <a:lstStyle/>
+          <a:p>
+            <a:r>
+              <a:rPr lang="en-US" dirty="0"/>
+              <a:t>Multi-threaded serving- </a:t>
+            </a:r>
+          </a:p>
+          <a:p>
+            <a:r>
+              <a:rPr lang="en-US" dirty="0"/>
+              <a:t>Each request can be handled in its own thread</a:t>
+            </a:r>
+          </a:p>
+          <a:p>
+            <a:r>
+              <a:rPr lang="en-US" dirty="0"/>
+              <a:t>Any individual thread can block </a:t>
+            </a:r>
+          </a:p>
+          <a:p>
+            <a:r>
+              <a:rPr lang="en-US" dirty="0"/>
+              <a:t>(as long as there are still some threads to handle the </a:t>
+            </a:r>
+          </a:p>
+          <a:p>
+            <a:r>
+              <a:rPr lang="en-US" dirty="0"/>
+              <a:t>new requests)</a:t>
+            </a:r>
+          </a:p>
+          <a:p>
+            <a:endParaRPr lang="en-US" dirty="0"/>
+          </a:p>
+          <a:p>
+            <a:r>
+              <a:rPr lang="en-US" dirty="0"/>
+              <a:t>Allow for shared access to mutable data structures.</a:t>
+            </a:r>
+          </a:p>
+        </p:txBody>
+      </p:sp>
+    </p:spTree>
+    <p:extLst>
+      <p:ext uri="{BB962C8B-B14F-4D97-AF65-F5344CB8AC3E}">
+        <p14:creationId xmlns:p14="http://schemas.microsoft.com/office/powerpoint/2010/main" val="3373104060"/>
+      </p:ext>
+    </p:extLst>
+  </p:cSld>
+  <p:clrMapOvr>
+    <a:masterClrMapping/>
+  </p:clrMapOvr>
+</p:sld>
+</file>
+
+<file path=ppt/slides/slide23.xml><?xml version="1.0" encoding="utf-8"?>
+<p:sld xmlns:a="http://schemas.openxmlformats.org/drawingml/2006/main" xmlns:r="http://schemas.openxmlformats.org/officeDocument/2006/relationships" xmlns:p="http://schemas.openxmlformats.org/presentationml/2006/main">
+  <p:cSld>
+    <p:spTree>
+      <p:nvGrpSpPr>
+        <p:cNvPr id="1" name=""/>
+        <p:cNvGrpSpPr/>
+        <p:nvPr/>
+      </p:nvGrpSpPr>
+      <p:grpSpPr>
+        <a:xfrm>
+          <a:off x="0" y="0"/>
+          <a:ext cx="0" cy="0"/>
+          <a:chOff x="0" y="0"/>
+          <a:chExt cx="0" cy="0"/>
+        </a:xfrm>
+      </p:grpSpPr>
+      <p:sp>
+        <p:nvSpPr>
+          <p:cNvPr id="4" name="TextBox 3">
+            <a:extLst>
+              <a:ext uri="{FF2B5EF4-FFF2-40B4-BE49-F238E27FC236}">
+                <a16:creationId xmlns:a16="http://schemas.microsoft.com/office/drawing/2014/main" id="{D0BF688F-5180-47A9-91F5-B2A02EE96F20}"/>
+              </a:ext>
+            </a:extLst>
+          </p:cNvPr>
+          <p:cNvSpPr txBox="1"/>
+          <p:nvPr/>
+        </p:nvSpPr>
+        <p:spPr>
+          <a:xfrm>
+            <a:off x="584200" y="10160"/>
+            <a:ext cx="5228226" cy="369332"/>
+          </a:xfrm>
+          <a:prstGeom prst="rect">
+            <a:avLst/>
+          </a:prstGeom>
+          <a:noFill/>
+        </p:spPr>
+        <p:txBody>
+          <a:bodyPr wrap="none" rtlCol="0">
+            <a:spAutoFit/>
+          </a:bodyPr>
+          <a:lstStyle/>
+          <a:p>
+            <a:r>
+              <a:rPr lang="en-US" dirty="0"/>
+              <a:t>With lack of overhead, node.js </a:t>
+            </a:r>
+            <a:r>
+              <a:rPr lang="en-US"/>
+              <a:t>can actually be faster…</a:t>
+            </a:r>
+          </a:p>
+        </p:txBody>
+      </p:sp>
+      <p:pic>
+        <p:nvPicPr>
+          <p:cNvPr id="5" name="Picture 4">
+            <a:extLst>
+              <a:ext uri="{FF2B5EF4-FFF2-40B4-BE49-F238E27FC236}">
+                <a16:creationId xmlns:a16="http://schemas.microsoft.com/office/drawing/2014/main" id="{112A6C43-0C52-4922-A620-76F6A9443EC2}"/>
+              </a:ext>
+            </a:extLst>
+          </p:cNvPr>
+          <p:cNvPicPr>
+            <a:picLocks noChangeAspect="1"/>
+          </p:cNvPicPr>
+          <p:nvPr/>
+        </p:nvPicPr>
+        <p:blipFill>
+          <a:blip r:embed="rId3"/>
+          <a:stretch>
+            <a:fillRect/>
+          </a:stretch>
+        </p:blipFill>
+        <p:spPr>
+          <a:xfrm>
+            <a:off x="206319" y="690881"/>
+            <a:ext cx="5290241" cy="3017538"/>
+          </a:xfrm>
+          <a:prstGeom prst="rect">
+            <a:avLst/>
+          </a:prstGeom>
+        </p:spPr>
+      </p:pic>
+      <p:pic>
+        <p:nvPicPr>
+          <p:cNvPr id="6" name="Picture 5">
+            <a:extLst>
+              <a:ext uri="{FF2B5EF4-FFF2-40B4-BE49-F238E27FC236}">
+                <a16:creationId xmlns:a16="http://schemas.microsoft.com/office/drawing/2014/main" id="{24EA2C7A-88E7-4625-84F1-22975DFB63D0}"/>
+              </a:ext>
+            </a:extLst>
+          </p:cNvPr>
+          <p:cNvPicPr>
+            <a:picLocks noChangeAspect="1"/>
+          </p:cNvPicPr>
+          <p:nvPr/>
+        </p:nvPicPr>
+        <p:blipFill>
+          <a:blip r:embed="rId4"/>
+          <a:stretch>
+            <a:fillRect/>
+          </a:stretch>
+        </p:blipFill>
+        <p:spPr>
+          <a:xfrm>
+            <a:off x="6144661" y="2484120"/>
+            <a:ext cx="4934819" cy="3972948"/>
+          </a:xfrm>
+          <a:prstGeom prst="rect">
+            <a:avLst/>
+          </a:prstGeom>
+        </p:spPr>
+      </p:pic>
+      <p:cxnSp>
+        <p:nvCxnSpPr>
+          <p:cNvPr id="8" name="Straight Connector 7">
+            <a:extLst>
+              <a:ext uri="{FF2B5EF4-FFF2-40B4-BE49-F238E27FC236}">
+                <a16:creationId xmlns:a16="http://schemas.microsoft.com/office/drawing/2014/main" id="{BF83557F-4DC7-4D96-AD49-A5DFA28602A4}"/>
+              </a:ext>
+            </a:extLst>
+          </p:cNvPr>
+          <p:cNvCxnSpPr/>
+          <p:nvPr/>
+        </p:nvCxnSpPr>
+        <p:spPr>
+          <a:xfrm>
+            <a:off x="5857240" y="142240"/>
+            <a:ext cx="0" cy="6578600"/>
+          </a:xfrm>
+          <a:prstGeom prst="line">
+            <a:avLst/>
+          </a:prstGeom>
+        </p:spPr>
+        <p:style>
+          <a:lnRef idx="1">
+            <a:schemeClr val="accent1"/>
+          </a:lnRef>
+          <a:fillRef idx="0">
+            <a:schemeClr val="accent1"/>
+          </a:fillRef>
+          <a:effectRef idx="0">
+            <a:schemeClr val="accent1"/>
+          </a:effectRef>
+          <a:fontRef idx="minor">
+            <a:schemeClr val="tx1"/>
+          </a:fontRef>
+        </p:style>
+      </p:cxnSp>
+      <p:sp>
+        <p:nvSpPr>
           <p:cNvPr id="2" name="Rectangle 1">
             <a:extLst>
               <a:ext uri="{FF2B5EF4-FFF2-40B4-BE49-F238E27FC236}">
@@ -6481,6 +6744,126 @@
     <p:extLst>
       <p:ext uri="{BB962C8B-B14F-4D97-AF65-F5344CB8AC3E}">
         <p14:creationId xmlns:p14="http://schemas.microsoft.com/office/powerpoint/2010/main" val="177190460"/>
+      </p:ext>
+    </p:extLst>
+  </p:cSld>
+  <p:clrMapOvr>
+    <a:masterClrMapping/>
+  </p:clrMapOvr>
+</p:sld>
+</file>
+
+<file path=ppt/slides/slide24.xml><?xml version="1.0" encoding="utf-8"?>
+<p:sld xmlns:a="http://schemas.openxmlformats.org/drawingml/2006/main" xmlns:r="http://schemas.openxmlformats.org/officeDocument/2006/relationships" xmlns:p="http://schemas.openxmlformats.org/presentationml/2006/main">
+  <p:cSld>
+    <p:spTree>
+      <p:nvGrpSpPr>
+        <p:cNvPr id="1" name=""/>
+        <p:cNvGrpSpPr/>
+        <p:nvPr/>
+      </p:nvGrpSpPr>
+      <p:grpSpPr>
+        <a:xfrm>
+          <a:off x="0" y="0"/>
+          <a:ext cx="0" cy="0"/>
+          <a:chOff x="0" y="0"/>
+          <a:chExt cx="0" cy="0"/>
+        </a:xfrm>
+      </p:grpSpPr>
+      <p:pic>
+        <p:nvPicPr>
+          <p:cNvPr id="4" name="Picture 3">
+            <a:extLst>
+              <a:ext uri="{FF2B5EF4-FFF2-40B4-BE49-F238E27FC236}">
+                <a16:creationId xmlns:a16="http://schemas.microsoft.com/office/drawing/2014/main" id="{C5B432D2-6BCF-4490-8228-10DAD78F9630}"/>
+              </a:ext>
+            </a:extLst>
+          </p:cNvPr>
+          <p:cNvPicPr>
+            <a:picLocks noChangeAspect="1"/>
+          </p:cNvPicPr>
+          <p:nvPr/>
+        </p:nvPicPr>
+        <p:blipFill>
+          <a:blip r:embed="rId2"/>
+          <a:stretch>
+            <a:fillRect/>
+          </a:stretch>
+        </p:blipFill>
+        <p:spPr>
+          <a:xfrm>
+            <a:off x="289560" y="1063063"/>
+            <a:ext cx="10364090" cy="5032938"/>
+          </a:xfrm>
+          <a:prstGeom prst="rect">
+            <a:avLst/>
+          </a:prstGeom>
+        </p:spPr>
+      </p:pic>
+    </p:spTree>
+    <p:extLst>
+      <p:ext uri="{BB962C8B-B14F-4D97-AF65-F5344CB8AC3E}">
+        <p14:creationId xmlns:p14="http://schemas.microsoft.com/office/powerpoint/2010/main" val="2683078128"/>
+      </p:ext>
+    </p:extLst>
+  </p:cSld>
+  <p:clrMapOvr>
+    <a:masterClrMapping/>
+  </p:clrMapOvr>
+</p:sld>
+</file>
+
+<file path=ppt/slides/slide25.xml><?xml version="1.0" encoding="utf-8"?>
+<p:sld xmlns:a="http://schemas.openxmlformats.org/drawingml/2006/main" xmlns:r="http://schemas.openxmlformats.org/officeDocument/2006/relationships" xmlns:p="http://schemas.openxmlformats.org/presentationml/2006/main">
+  <p:cSld>
+    <p:spTree>
+      <p:nvGrpSpPr>
+        <p:cNvPr id="1" name=""/>
+        <p:cNvGrpSpPr/>
+        <p:nvPr/>
+      </p:nvGrpSpPr>
+      <p:grpSpPr>
+        <a:xfrm>
+          <a:off x="0" y="0"/>
+          <a:ext cx="0" cy="0"/>
+          <a:chOff x="0" y="0"/>
+          <a:chExt cx="0" cy="0"/>
+        </a:xfrm>
+      </p:grpSpPr>
+      <p:pic>
+        <p:nvPicPr>
+          <p:cNvPr id="4" name="Picture 3">
+            <a:extLst>
+              <a:ext uri="{FF2B5EF4-FFF2-40B4-BE49-F238E27FC236}">
+                <a16:creationId xmlns:a16="http://schemas.microsoft.com/office/drawing/2014/main" id="{C4F7F74B-7BA5-4D9E-B897-B83940E5D511}"/>
+              </a:ext>
+            </a:extLst>
+          </p:cNvPr>
+          <p:cNvPicPr>
+            <a:picLocks noChangeAspect="1"/>
+          </p:cNvPicPr>
+          <p:nvPr/>
+        </p:nvPicPr>
+        <p:blipFill>
+          <a:blip r:embed="rId2"/>
+          <a:stretch>
+            <a:fillRect/>
+          </a:stretch>
+        </p:blipFill>
+        <p:spPr>
+          <a:xfrm>
+            <a:off x="1061720" y="333026"/>
+            <a:ext cx="9828966" cy="6265893"/>
+          </a:xfrm>
+          <a:prstGeom prst="rect">
+            <a:avLst/>
+          </a:prstGeom>
+        </p:spPr>
+      </p:pic>
+    </p:spTree>
+    <p:extLst>
+      <p:ext uri="{BB962C8B-B14F-4D97-AF65-F5344CB8AC3E}">
+        <p14:creationId xmlns:p14="http://schemas.microsoft.com/office/powerpoint/2010/main" val="3293623462"/>
       </p:ext>
     </p:extLst>
   </p:cSld>

</xml_diff>